<commit_message>
Update Presentation For Final Submission.
</commit_message>
<xml_diff>
--- a/CLC_Milestone_6/CLCPowerPointPresentation.pptx
+++ b/CLC_Milestone_6/CLCPowerPointPresentation.pptx
@@ -5,21 +5,23 @@
     <p:sldMasterId id="2147483660" r:id="rId1"/>
   </p:sldMasterIdLst>
   <p:notesMasterIdLst>
-    <p:notesMasterId r:id="rId14"/>
+    <p:notesMasterId r:id="rId16"/>
   </p:notesMasterIdLst>
   <p:sldIdLst>
     <p:sldId id="256" r:id="rId2"/>
     <p:sldId id="257" r:id="rId3"/>
     <p:sldId id="258" r:id="rId4"/>
-    <p:sldId id="259" r:id="rId5"/>
-    <p:sldId id="269" r:id="rId6"/>
-    <p:sldId id="268" r:id="rId7"/>
-    <p:sldId id="260" r:id="rId8"/>
-    <p:sldId id="263" r:id="rId9"/>
-    <p:sldId id="267" r:id="rId10"/>
-    <p:sldId id="265" r:id="rId11"/>
-    <p:sldId id="264" r:id="rId12"/>
-    <p:sldId id="266" r:id="rId13"/>
+    <p:sldId id="270" r:id="rId5"/>
+    <p:sldId id="271" r:id="rId6"/>
+    <p:sldId id="259" r:id="rId7"/>
+    <p:sldId id="269" r:id="rId8"/>
+    <p:sldId id="268" r:id="rId9"/>
+    <p:sldId id="260" r:id="rId10"/>
+    <p:sldId id="263" r:id="rId11"/>
+    <p:sldId id="267" r:id="rId12"/>
+    <p:sldId id="265" r:id="rId13"/>
+    <p:sldId id="264" r:id="rId14"/>
+    <p:sldId id="266" r:id="rId15"/>
   </p:sldIdLst>
   <p:sldSz cx="9144000" cy="6858000" type="screen4x3"/>
   <p:notesSz cx="6858000" cy="9144000"/>
@@ -220,7 +222,7 @@
             <a:fld id="{3BFA83B3-BF5C-4A6C-938C-B2FB7D690DA3}" type="datetimeFigureOut">
               <a:rPr lang="en-US" smtClean="0"/>
               <a:pPr/>
-              <a:t>20-Feb-21</a:t>
+              <a:t>21-Feb-21</a:t>
             </a:fld>
             <a:endParaRPr lang="en-US" dirty="0"/>
           </a:p>
@@ -538,7 +540,7 @@
           <a:p>
             <a:r>
               <a:rPr lang="en-US" dirty="0"/>
-              <a:t>This is a presentation for the CLC- Project assignment for CST-341 Open Source Computing.</a:t>
+              <a:t>This is a presentation for the CLC- Project assignment for CST-247 Enterprise Applications.</a:t>
             </a:r>
           </a:p>
           <a:p>
@@ -690,7 +692,7 @@
             <a:fld id="{2503143C-6C60-49A5-9C86-15F450F9D3F3}" type="slidenum">
               <a:rPr lang="en-US" smtClean="0"/>
               <a:pPr/>
-              <a:t>10</a:t>
+              <a:t>12</a:t>
             </a:fld>
             <a:endParaRPr lang="en-US" dirty="0"/>
           </a:p>
@@ -793,7 +795,7 @@
             <a:fld id="{2503143C-6C60-49A5-9C86-15F450F9D3F3}" type="slidenum">
               <a:rPr lang="en-US" smtClean="0"/>
               <a:pPr/>
-              <a:t>11</a:t>
+              <a:t>13</a:t>
             </a:fld>
             <a:endParaRPr lang="en-US" dirty="0"/>
           </a:p>
@@ -875,7 +877,7 @@
             <a:fld id="{2503143C-6C60-49A5-9C86-15F450F9D3F3}" type="slidenum">
               <a:rPr lang="en-US" smtClean="0"/>
               <a:pPr/>
-              <a:t>12</a:t>
+              <a:t>14</a:t>
             </a:fld>
             <a:endParaRPr lang="en-US" dirty="0"/>
           </a:p>
@@ -935,18 +937,28 @@
           </a:bodyPr>
           <a:lstStyle/>
           <a:p>
+            <a:endParaRPr lang="en-US" baseline="0" dirty="0"/>
+          </a:p>
+          <a:p>
             <a:r>
               <a:rPr lang="en-US" baseline="0" dirty="0"/>
-              <a:t>In the first week of class our group decided to make a Music Management program which is launched via a webpage.</a:t>
-            </a:r>
-          </a:p>
-          <a:p>
-            <a:endParaRPr lang="en-US" baseline="0" dirty="0"/>
-          </a:p>
-          <a:p>
+              <a:t>The backbone of this project is ASP </a:t>
+            </a:r>
+            <a:r>
+              <a:rPr lang="en-US" baseline="0" dirty="0" err="1"/>
+              <a:t>.Net</a:t>
+            </a:r>
             <a:r>
               <a:rPr lang="en-US" baseline="0" dirty="0"/>
-              <a:t>The backbone of this project is Java with other languages incorporated throughout such as, Spring Framework, Java Servlet Pages, Derby Database linked though SQL scripting, Maven and others.</a:t>
+              <a:t> MVC with </a:t>
+            </a:r>
+            <a:r>
+              <a:rPr lang="en-US" baseline="0" dirty="0" err="1"/>
+              <a:t>NLog</a:t>
+            </a:r>
+            <a:r>
+              <a:rPr lang="en-US" baseline="0" dirty="0"/>
+              <a:t>, and other packages as well.</a:t>
             </a:r>
           </a:p>
           <a:p>
@@ -1057,49 +1069,6 @@
             </a:pPr>
             <a:r>
               <a:rPr lang="en-US" dirty="0"/>
-              <a:t>To build this program the Eclipse IDE was used to incorporate the different languages an features through an easy integration process. </a:t>
-            </a:r>
-          </a:p>
-          <a:p>
-            <a:pPr marL="0" marR="0" indent="0" algn="l" defTabSz="914400" rtl="0" eaLnBrk="1" fontAlgn="auto" latinLnBrk="0" hangingPunct="1">
-              <a:lnSpc>
-                <a:spcPct val="100000"/>
-              </a:lnSpc>
-              <a:spcBef>
-                <a:spcPts val="0"/>
-              </a:spcBef>
-              <a:spcAft>
-                <a:spcPts val="0"/>
-              </a:spcAft>
-              <a:buClrTx/>
-              <a:buSzTx/>
-              <a:buFontTx/>
-              <a:buNone/>
-              <a:tabLst/>
-              <a:defRPr/>
-            </a:pPr>
-            <a:endParaRPr lang="en-US" dirty="0"/>
-          </a:p>
-          <a:p>
-            <a:pPr marL="0" marR="0" indent="0" algn="l" defTabSz="914400" rtl="0" eaLnBrk="1" fontAlgn="auto" latinLnBrk="0" hangingPunct="1">
-              <a:lnSpc>
-                <a:spcPct val="100000"/>
-              </a:lnSpc>
-              <a:spcBef>
-                <a:spcPts val="0"/>
-              </a:spcBef>
-              <a:spcAft>
-                <a:spcPts val="0"/>
-              </a:spcAft>
-              <a:buClrTx/>
-              <a:buSzTx/>
-              <a:buFontTx/>
-              <a:buNone/>
-              <a:tabLst/>
-              <a:defRPr/>
-            </a:pPr>
-            <a:r>
-              <a:rPr lang="en-US" dirty="0"/>
               <a:t>Here we have an overview of the program with the layout of the pages which render and what content is attributed to each page. </a:t>
             </a:r>
           </a:p>
@@ -1271,7 +1240,7 @@
           <a:p>
             <a:r>
               <a:rPr lang="en-US" dirty="0"/>
-              <a:t>On this slide we can see the Different Classes used in the base code along with their attributes and content.</a:t>
+              <a:t>On this slide we can see the User Class UML used in the base code along with their attributes and content.</a:t>
             </a:r>
           </a:p>
           <a:p>
@@ -1312,7 +1281,7 @@
             <a:fld id="{2503143C-6C60-49A5-9C86-15F450F9D3F3}" type="slidenum">
               <a:rPr lang="en-US" smtClean="0"/>
               <a:pPr/>
-              <a:t>4</a:t>
+              <a:t>6</a:t>
             </a:fld>
             <a:endParaRPr lang="en-US"/>
           </a:p>
@@ -1432,7 +1401,7 @@
             <a:fld id="{2503143C-6C60-49A5-9C86-15F450F9D3F3}" type="slidenum">
               <a:rPr lang="en-US" smtClean="0"/>
               <a:pPr/>
-              <a:t>5</a:t>
+              <a:t>7</a:t>
             </a:fld>
             <a:endParaRPr lang="en-US"/>
           </a:p>
@@ -1531,7 +1500,7 @@
             <a:fld id="{2503143C-6C60-49A5-9C86-15F450F9D3F3}" type="slidenum">
               <a:rPr lang="en-US" smtClean="0"/>
               <a:pPr/>
-              <a:t>6</a:t>
+              <a:t>8</a:t>
             </a:fld>
             <a:endParaRPr lang="en-US"/>
           </a:p>
@@ -1621,7 +1590,7 @@
             <a:fld id="{2503143C-6C60-49A5-9C86-15F450F9D3F3}" type="slidenum">
               <a:rPr lang="en-US" smtClean="0"/>
               <a:pPr/>
-              <a:t>7</a:t>
+              <a:t>9</a:t>
             </a:fld>
             <a:endParaRPr lang="en-US"/>
           </a:p>
@@ -1726,7 +1695,7 @@
             <a:fld id="{2503143C-6C60-49A5-9C86-15F450F9D3F3}" type="slidenum">
               <a:rPr lang="en-US" smtClean="0"/>
               <a:pPr/>
-              <a:t>8</a:t>
+              <a:t>10</a:t>
             </a:fld>
             <a:endParaRPr lang="en-US" dirty="0"/>
           </a:p>
@@ -1831,7 +1800,7 @@
             <a:fld id="{2503143C-6C60-49A5-9C86-15F450F9D3F3}" type="slidenum">
               <a:rPr lang="en-US" smtClean="0"/>
               <a:pPr/>
-              <a:t>9</a:t>
+              <a:t>11</a:t>
             </a:fld>
             <a:endParaRPr lang="en-US" dirty="0"/>
           </a:p>
@@ -2115,7 +2084,7 @@
             <a:fld id="{CB750396-183E-47E6-A9AB-8B4DFEB4B0B5}" type="datetimeFigureOut">
               <a:rPr lang="en-US" smtClean="0"/>
               <a:pPr/>
-              <a:t>20-Feb-21</a:t>
+              <a:t>21-Feb-21</a:t>
             </a:fld>
             <a:endParaRPr lang="en-US" dirty="0"/>
           </a:p>
@@ -2309,7 +2278,7 @@
             <a:fld id="{CB750396-183E-47E6-A9AB-8B4DFEB4B0B5}" type="datetimeFigureOut">
               <a:rPr lang="en-US" smtClean="0"/>
               <a:pPr/>
-              <a:t>20-Feb-21</a:t>
+              <a:t>21-Feb-21</a:t>
             </a:fld>
             <a:endParaRPr lang="en-US" dirty="0"/>
           </a:p>
@@ -2490,7 +2459,7 @@
             <a:fld id="{CB750396-183E-47E6-A9AB-8B4DFEB4B0B5}" type="datetimeFigureOut">
               <a:rPr lang="en-US" smtClean="0"/>
               <a:pPr/>
-              <a:t>20-Feb-21</a:t>
+              <a:t>21-Feb-21</a:t>
             </a:fld>
             <a:endParaRPr lang="en-US" dirty="0"/>
           </a:p>
@@ -2675,7 +2644,7 @@
             <a:fld id="{CB750396-183E-47E6-A9AB-8B4DFEB4B0B5}" type="datetimeFigureOut">
               <a:rPr lang="en-US" smtClean="0"/>
               <a:pPr/>
-              <a:t>20-Feb-21</a:t>
+              <a:t>21-Feb-21</a:t>
             </a:fld>
             <a:endParaRPr lang="en-US" dirty="0"/>
           </a:p>
@@ -2898,7 +2867,7 @@
             <a:fld id="{CB750396-183E-47E6-A9AB-8B4DFEB4B0B5}" type="datetimeFigureOut">
               <a:rPr lang="en-US" smtClean="0"/>
               <a:pPr/>
-              <a:t>20-Feb-21</a:t>
+              <a:t>21-Feb-21</a:t>
             </a:fld>
             <a:endParaRPr lang="en-US" dirty="0"/>
           </a:p>
@@ -3184,7 +3153,7 @@
             <a:fld id="{CB750396-183E-47E6-A9AB-8B4DFEB4B0B5}" type="datetimeFigureOut">
               <a:rPr lang="en-US" smtClean="0"/>
               <a:pPr/>
-              <a:t>20-Feb-21</a:t>
+              <a:t>21-Feb-21</a:t>
             </a:fld>
             <a:endParaRPr lang="en-US" dirty="0"/>
           </a:p>
@@ -3610,7 +3579,7 @@
             <a:fld id="{CB750396-183E-47E6-A9AB-8B4DFEB4B0B5}" type="datetimeFigureOut">
               <a:rPr lang="en-US" smtClean="0"/>
               <a:pPr/>
-              <a:t>20-Feb-21</a:t>
+              <a:t>21-Feb-21</a:t>
             </a:fld>
             <a:endParaRPr lang="en-US" dirty="0"/>
           </a:p>
@@ -3729,7 +3698,7 @@
             <a:fld id="{CB750396-183E-47E6-A9AB-8B4DFEB4B0B5}" type="datetimeFigureOut">
               <a:rPr lang="en-US" smtClean="0"/>
               <a:pPr/>
-              <a:t>20-Feb-21</a:t>
+              <a:t>21-Feb-21</a:t>
             </a:fld>
             <a:endParaRPr lang="en-US" dirty="0"/>
           </a:p>
@@ -3830,7 +3799,7 @@
             <a:fld id="{CB750396-183E-47E6-A9AB-8B4DFEB4B0B5}" type="datetimeFigureOut">
               <a:rPr lang="en-US" smtClean="0"/>
               <a:pPr/>
-              <a:t>20-Feb-21</a:t>
+              <a:t>21-Feb-21</a:t>
             </a:fld>
             <a:endParaRPr lang="en-US" dirty="0"/>
           </a:p>
@@ -4096,7 +4065,7 @@
             <a:fld id="{CB750396-183E-47E6-A9AB-8B4DFEB4B0B5}" type="datetimeFigureOut">
               <a:rPr lang="en-US" smtClean="0"/>
               <a:pPr/>
-              <a:t>20-Feb-21</a:t>
+              <a:t>21-Feb-21</a:t>
             </a:fld>
             <a:endParaRPr lang="en-US" dirty="0"/>
           </a:p>
@@ -4452,7 +4421,7 @@
             <a:fld id="{CB750396-183E-47E6-A9AB-8B4DFEB4B0B5}" type="datetimeFigureOut">
               <a:rPr lang="en-US" smtClean="0"/>
               <a:pPr/>
-              <a:t>20-Feb-21</a:t>
+              <a:t>21-Feb-21</a:t>
             </a:fld>
             <a:endParaRPr lang="en-US" dirty="0"/>
           </a:p>
@@ -4796,7 +4765,7 @@
             <a:fld id="{CB750396-183E-47E6-A9AB-8B4DFEB4B0B5}" type="datetimeFigureOut">
               <a:rPr lang="en-US" smtClean="0"/>
               <a:pPr/>
-              <a:t>20-Feb-21</a:t>
+              <a:t>21-Feb-21</a:t>
             </a:fld>
             <a:endParaRPr lang="en-US" dirty="0"/>
           </a:p>
@@ -5347,6 +5316,1059 @@
       </p:grpSpPr>
       <p:sp>
         <p:nvSpPr>
+          <p:cNvPr id="2" name="Title 1"/>
+          <p:cNvSpPr>
+            <a:spLocks noGrp="1"/>
+          </p:cNvSpPr>
+          <p:nvPr>
+            <p:ph type="title"/>
+          </p:nvPr>
+        </p:nvSpPr>
+        <p:spPr>
+          <a:xfrm>
+            <a:off x="457200" y="320040"/>
+            <a:ext cx="7239000" cy="518160"/>
+          </a:xfrm>
+        </p:spPr>
+        <p:txBody>
+          <a:bodyPr>
+            <a:normAutofit fontScale="90000"/>
+          </a:bodyPr>
+          <a:lstStyle/>
+          <a:p>
+            <a:r>
+              <a:rPr lang="en-US" dirty="0"/>
+              <a:t>Risks Continued</a:t>
+            </a:r>
+          </a:p>
+        </p:txBody>
+      </p:sp>
+      <p:graphicFrame>
+        <p:nvGraphicFramePr>
+          <p:cNvPr id="5" name="Content Placeholder 4">
+            <a:extLst>
+              <a:ext uri="{FF2B5EF4-FFF2-40B4-BE49-F238E27FC236}">
+                <a16:creationId xmlns:a16="http://schemas.microsoft.com/office/drawing/2014/main" id="{D90AF8D3-9E2C-44FD-8BAD-7B7982F9C08E}"/>
+              </a:ext>
+            </a:extLst>
+          </p:cNvPr>
+          <p:cNvGraphicFramePr>
+            <a:graphicFrameLocks noGrp="1"/>
+          </p:cNvGraphicFramePr>
+          <p:nvPr>
+            <p:ph idx="1"/>
+            <p:extLst>
+              <p:ext uri="{D42A27DB-BD31-4B8C-83A1-F6EECF244321}">
+                <p14:modId xmlns:p14="http://schemas.microsoft.com/office/powerpoint/2010/main" val="2560146335"/>
+              </p:ext>
+            </p:extLst>
+          </p:nvPr>
+        </p:nvGraphicFramePr>
+        <p:xfrm>
+          <a:off x="457200" y="1066800"/>
+          <a:ext cx="7239000" cy="5476081"/>
+        </p:xfrm>
+        <a:graphic>
+          <a:graphicData uri="http://schemas.openxmlformats.org/drawingml/2006/table">
+            <a:tbl>
+              <a:tblPr bandRow="1">
+                <a:tableStyleId>{5C22544A-7EE6-4342-B048-85BDC9FD1C3A}</a:tableStyleId>
+              </a:tblPr>
+              <a:tblGrid>
+                <a:gridCol w="1809498">
+                  <a:extLst>
+                    <a:ext uri="{9D8B030D-6E8A-4147-A177-3AD203B41FA5}">
+                      <a16:colId xmlns:a16="http://schemas.microsoft.com/office/drawing/2014/main" val="2592429754"/>
+                    </a:ext>
+                  </a:extLst>
+                </a:gridCol>
+                <a:gridCol w="1809498">
+                  <a:extLst>
+                    <a:ext uri="{9D8B030D-6E8A-4147-A177-3AD203B41FA5}">
+                      <a16:colId xmlns:a16="http://schemas.microsoft.com/office/drawing/2014/main" val="3809378308"/>
+                    </a:ext>
+                  </a:extLst>
+                </a:gridCol>
+                <a:gridCol w="1810002">
+                  <a:extLst>
+                    <a:ext uri="{9D8B030D-6E8A-4147-A177-3AD203B41FA5}">
+                      <a16:colId xmlns:a16="http://schemas.microsoft.com/office/drawing/2014/main" val="3618545182"/>
+                    </a:ext>
+                  </a:extLst>
+                </a:gridCol>
+                <a:gridCol w="1810002">
+                  <a:extLst>
+                    <a:ext uri="{9D8B030D-6E8A-4147-A177-3AD203B41FA5}">
+                      <a16:colId xmlns:a16="http://schemas.microsoft.com/office/drawing/2014/main" val="152360603"/>
+                    </a:ext>
+                  </a:extLst>
+                </a:gridCol>
+              </a:tblGrid>
+              <a:tr h="2093796">
+                <a:tc>
+                  <a:txBody>
+                    <a:bodyPr/>
+                    <a:lstStyle/>
+                    <a:p>
+                      <a:pPr marL="0" marR="0">
+                        <a:spcBef>
+                          <a:spcPts val="0"/>
+                        </a:spcBef>
+                        <a:spcAft>
+                          <a:spcPts val="0"/>
+                        </a:spcAft>
+                      </a:pPr>
+                      <a:r>
+                        <a:rPr lang="en-US" sz="1000">
+                          <a:effectLst/>
+                        </a:rPr>
+                        <a:t>Internet/Git</a:t>
+                      </a:r>
+                      <a:endParaRPr lang="en-US" sz="1000">
+                        <a:effectLst/>
+                        <a:latin typeface="Calibri" panose="020F0502020204030204" pitchFamily="34" charset="0"/>
+                        <a:ea typeface="Calibri" panose="020F0502020204030204" pitchFamily="34" charset="0"/>
+                        <a:cs typeface="Times New Roman" panose="02020603050405020304" pitchFamily="18" charset="0"/>
+                      </a:endParaRPr>
+                    </a:p>
+                  </a:txBody>
+                  <a:tcPr marL="54349" marR="54349" marT="0" marB="0"/>
+                </a:tc>
+                <a:tc>
+                  <a:txBody>
+                    <a:bodyPr/>
+                    <a:lstStyle/>
+                    <a:p>
+                      <a:pPr marL="0" marR="0">
+                        <a:spcBef>
+                          <a:spcPts val="0"/>
+                        </a:spcBef>
+                        <a:spcAft>
+                          <a:spcPts val="0"/>
+                        </a:spcAft>
+                      </a:pPr>
+                      <a:r>
+                        <a:rPr lang="en-US" sz="1000">
+                          <a:effectLst/>
+                        </a:rPr>
+                        <a:t>The internet could possibly go out for one of us, and that is detrimental to pushing code to GIT. Also, if GIT were to go down, we would not be able to share or access our working trees. </a:t>
+                      </a:r>
+                      <a:endParaRPr lang="en-US" sz="1000">
+                        <a:effectLst/>
+                        <a:latin typeface="Calibri" panose="020F0502020204030204" pitchFamily="34" charset="0"/>
+                        <a:ea typeface="Calibri" panose="020F0502020204030204" pitchFamily="34" charset="0"/>
+                        <a:cs typeface="Times New Roman" panose="02020603050405020304" pitchFamily="18" charset="0"/>
+                      </a:endParaRPr>
+                    </a:p>
+                  </a:txBody>
+                  <a:tcPr marL="54349" marR="54349" marT="0" marB="0"/>
+                </a:tc>
+                <a:tc>
+                  <a:txBody>
+                    <a:bodyPr/>
+                    <a:lstStyle/>
+                    <a:p>
+                      <a:pPr marL="0" marR="0">
+                        <a:spcBef>
+                          <a:spcPts val="0"/>
+                        </a:spcBef>
+                        <a:spcAft>
+                          <a:spcPts val="0"/>
+                        </a:spcAft>
+                      </a:pPr>
+                      <a:r>
+                        <a:rPr lang="en-US" sz="1000">
+                          <a:effectLst/>
+                        </a:rPr>
+                        <a:t>Make sure the internet is functional at your home, if it is not having a place you can go to that has internet for you to use. Pay bills ahead of time if necessary.</a:t>
+                      </a:r>
+                      <a:endParaRPr lang="en-US" sz="1000">
+                        <a:effectLst/>
+                        <a:latin typeface="Calibri" panose="020F0502020204030204" pitchFamily="34" charset="0"/>
+                        <a:ea typeface="Calibri" panose="020F0502020204030204" pitchFamily="34" charset="0"/>
+                        <a:cs typeface="Times New Roman" panose="02020603050405020304" pitchFamily="18" charset="0"/>
+                      </a:endParaRPr>
+                    </a:p>
+                  </a:txBody>
+                  <a:tcPr marL="54349" marR="54349" marT="0" marB="0"/>
+                </a:tc>
+                <a:tc>
+                  <a:txBody>
+                    <a:bodyPr/>
+                    <a:lstStyle/>
+                    <a:p>
+                      <a:pPr marL="0" marR="0">
+                        <a:spcBef>
+                          <a:spcPts val="0"/>
+                        </a:spcBef>
+                        <a:spcAft>
+                          <a:spcPts val="0"/>
+                        </a:spcAft>
+                      </a:pPr>
+                      <a:r>
+                        <a:rPr lang="en-US" sz="1000">
+                          <a:effectLst/>
+                        </a:rPr>
+                        <a:t>Keeping the bills paid early from month to month is a simple start. Make sure you pay attention to possible outages and have a backup place to go if yours does go down. Find a coffee shop that has free Wi-Fi, or a friend’s home that they will allow you to use. Watch to see if GIT notifies on outages or possible updates and changes.</a:t>
+                      </a:r>
+                      <a:endParaRPr lang="en-US" sz="1000">
+                        <a:effectLst/>
+                        <a:latin typeface="Calibri" panose="020F0502020204030204" pitchFamily="34" charset="0"/>
+                        <a:ea typeface="Calibri" panose="020F0502020204030204" pitchFamily="34" charset="0"/>
+                        <a:cs typeface="Times New Roman" panose="02020603050405020304" pitchFamily="18" charset="0"/>
+                      </a:endParaRPr>
+                    </a:p>
+                  </a:txBody>
+                  <a:tcPr marL="54349" marR="54349" marT="0" marB="0"/>
+                </a:tc>
+                <a:extLst>
+                  <a:ext uri="{0D108BD9-81ED-4DB2-BD59-A6C34878D82A}">
+                    <a16:rowId xmlns:a16="http://schemas.microsoft.com/office/drawing/2014/main" val="2860719083"/>
+                  </a:ext>
+                </a:extLst>
+              </a:tr>
+              <a:tr h="1610612">
+                <a:tc>
+                  <a:txBody>
+                    <a:bodyPr/>
+                    <a:lstStyle/>
+                    <a:p>
+                      <a:pPr marL="0" marR="0">
+                        <a:spcBef>
+                          <a:spcPts val="0"/>
+                        </a:spcBef>
+                        <a:spcAft>
+                          <a:spcPts val="0"/>
+                        </a:spcAft>
+                      </a:pPr>
+                      <a:r>
+                        <a:rPr lang="en-US" sz="1000">
+                          <a:effectLst/>
+                        </a:rPr>
+                        <a:t>Individual’s not fulfilling sprint tasks</a:t>
+                      </a:r>
+                      <a:endParaRPr lang="en-US" sz="1000">
+                        <a:effectLst/>
+                        <a:latin typeface="Calibri" panose="020F0502020204030204" pitchFamily="34" charset="0"/>
+                        <a:ea typeface="Calibri" panose="020F0502020204030204" pitchFamily="34" charset="0"/>
+                        <a:cs typeface="Times New Roman" panose="02020603050405020304" pitchFamily="18" charset="0"/>
+                      </a:endParaRPr>
+                    </a:p>
+                  </a:txBody>
+                  <a:tcPr marL="54349" marR="54349" marT="0" marB="0"/>
+                </a:tc>
+                <a:tc>
+                  <a:txBody>
+                    <a:bodyPr/>
+                    <a:lstStyle/>
+                    <a:p>
+                      <a:pPr marL="0" marR="0">
+                        <a:spcBef>
+                          <a:spcPts val="0"/>
+                        </a:spcBef>
+                        <a:spcAft>
+                          <a:spcPts val="0"/>
+                        </a:spcAft>
+                      </a:pPr>
+                      <a:r>
+                        <a:rPr lang="en-US" sz="1000">
+                          <a:effectLst/>
+                        </a:rPr>
+                        <a:t>Any one of the issues listed could work against us, but not being involved in the development process and getting the individually assigned work done hurts the team. </a:t>
+                      </a:r>
+                      <a:endParaRPr lang="en-US" sz="1000">
+                        <a:effectLst/>
+                        <a:latin typeface="Calibri" panose="020F0502020204030204" pitchFamily="34" charset="0"/>
+                        <a:ea typeface="Calibri" panose="020F0502020204030204" pitchFamily="34" charset="0"/>
+                        <a:cs typeface="Times New Roman" panose="02020603050405020304" pitchFamily="18" charset="0"/>
+                      </a:endParaRPr>
+                    </a:p>
+                  </a:txBody>
+                  <a:tcPr marL="54349" marR="54349" marT="0" marB="0"/>
+                </a:tc>
+                <a:tc>
+                  <a:txBody>
+                    <a:bodyPr/>
+                    <a:lstStyle/>
+                    <a:p>
+                      <a:pPr marL="0" marR="0">
+                        <a:spcBef>
+                          <a:spcPts val="0"/>
+                        </a:spcBef>
+                        <a:spcAft>
+                          <a:spcPts val="0"/>
+                        </a:spcAft>
+                      </a:pPr>
+                      <a:r>
+                        <a:rPr lang="en-US" sz="1000">
+                          <a:effectLst/>
+                        </a:rPr>
+                        <a:t>Keeping each other accountable for the work needed to be done. Making sure we mark off tasks and stay in communication.</a:t>
+                      </a:r>
+                      <a:endParaRPr lang="en-US" sz="1000">
+                        <a:effectLst/>
+                        <a:latin typeface="Calibri" panose="020F0502020204030204" pitchFamily="34" charset="0"/>
+                        <a:ea typeface="Calibri" panose="020F0502020204030204" pitchFamily="34" charset="0"/>
+                        <a:cs typeface="Times New Roman" panose="02020603050405020304" pitchFamily="18" charset="0"/>
+                      </a:endParaRPr>
+                    </a:p>
+                  </a:txBody>
+                  <a:tcPr marL="54349" marR="54349" marT="0" marB="0"/>
+                </a:tc>
+                <a:tc>
+                  <a:txBody>
+                    <a:bodyPr/>
+                    <a:lstStyle/>
+                    <a:p>
+                      <a:pPr marL="0" marR="0">
+                        <a:spcBef>
+                          <a:spcPts val="0"/>
+                        </a:spcBef>
+                        <a:spcAft>
+                          <a:spcPts val="0"/>
+                        </a:spcAft>
+                      </a:pPr>
+                      <a:r>
+                        <a:rPr lang="en-US" sz="1000">
+                          <a:effectLst/>
+                        </a:rPr>
+                        <a:t>Stay on task, this is not about an individual grade, we are in this together. If you are going to need some slack for the week let the team know and we can work something out. It may even be possible to get extensions if we can let the instructor know about something going on. </a:t>
+                      </a:r>
+                      <a:endParaRPr lang="en-US" sz="1000">
+                        <a:effectLst/>
+                        <a:latin typeface="Calibri" panose="020F0502020204030204" pitchFamily="34" charset="0"/>
+                        <a:ea typeface="Calibri" panose="020F0502020204030204" pitchFamily="34" charset="0"/>
+                        <a:cs typeface="Times New Roman" panose="02020603050405020304" pitchFamily="18" charset="0"/>
+                      </a:endParaRPr>
+                    </a:p>
+                  </a:txBody>
+                  <a:tcPr marL="54349" marR="54349" marT="0" marB="0"/>
+                </a:tc>
+                <a:extLst>
+                  <a:ext uri="{0D108BD9-81ED-4DB2-BD59-A6C34878D82A}">
+                    <a16:rowId xmlns:a16="http://schemas.microsoft.com/office/drawing/2014/main" val="2440786370"/>
+                  </a:ext>
+                </a:extLst>
+              </a:tr>
+              <a:tr h="1771673">
+                <a:tc>
+                  <a:txBody>
+                    <a:bodyPr/>
+                    <a:lstStyle/>
+                    <a:p>
+                      <a:pPr marL="0" marR="0">
+                        <a:spcBef>
+                          <a:spcPts val="0"/>
+                        </a:spcBef>
+                        <a:spcAft>
+                          <a:spcPts val="0"/>
+                        </a:spcAft>
+                      </a:pPr>
+                      <a:r>
+                        <a:rPr lang="en-US" sz="1000">
+                          <a:effectLst/>
+                        </a:rPr>
+                        <a:t>New skills needed to complete tasks</a:t>
+                      </a:r>
+                      <a:endParaRPr lang="en-US" sz="1000">
+                        <a:effectLst/>
+                        <a:latin typeface="Calibri" panose="020F0502020204030204" pitchFamily="34" charset="0"/>
+                        <a:ea typeface="Calibri" panose="020F0502020204030204" pitchFamily="34" charset="0"/>
+                        <a:cs typeface="Times New Roman" panose="02020603050405020304" pitchFamily="18" charset="0"/>
+                      </a:endParaRPr>
+                    </a:p>
+                  </a:txBody>
+                  <a:tcPr marL="54349" marR="54349" marT="0" marB="0"/>
+                </a:tc>
+                <a:tc>
+                  <a:txBody>
+                    <a:bodyPr/>
+                    <a:lstStyle/>
+                    <a:p>
+                      <a:pPr marL="0" marR="0">
+                        <a:spcBef>
+                          <a:spcPts val="0"/>
+                        </a:spcBef>
+                        <a:spcAft>
+                          <a:spcPts val="0"/>
+                        </a:spcAft>
+                      </a:pPr>
+                      <a:r>
+                        <a:rPr lang="en-US" sz="1000">
+                          <a:effectLst/>
+                        </a:rPr>
+                        <a:t>Since we are all in school, it is assumed we all have something to learn. Be it the environment, language or process. There is a learning curve attached to them all and everyone has to be diligent in trying to learn in a timely manner. </a:t>
+                      </a:r>
+                      <a:endParaRPr lang="en-US" sz="1000">
+                        <a:effectLst/>
+                        <a:latin typeface="Calibri" panose="020F0502020204030204" pitchFamily="34" charset="0"/>
+                        <a:ea typeface="Calibri" panose="020F0502020204030204" pitchFamily="34" charset="0"/>
+                        <a:cs typeface="Times New Roman" panose="02020603050405020304" pitchFamily="18" charset="0"/>
+                      </a:endParaRPr>
+                    </a:p>
+                  </a:txBody>
+                  <a:tcPr marL="54349" marR="54349" marT="0" marB="0"/>
+                </a:tc>
+                <a:tc>
+                  <a:txBody>
+                    <a:bodyPr/>
+                    <a:lstStyle/>
+                    <a:p>
+                      <a:pPr marL="0" marR="0">
+                        <a:spcBef>
+                          <a:spcPts val="0"/>
+                        </a:spcBef>
+                        <a:spcAft>
+                          <a:spcPts val="0"/>
+                        </a:spcAft>
+                      </a:pPr>
+                      <a:r>
+                        <a:rPr lang="en-US" sz="1000">
+                          <a:effectLst/>
+                        </a:rPr>
+                        <a:t>If there is something, we need to learn in order to get the tasks for the week done, let the team know as soon as possible.</a:t>
+                      </a:r>
+                      <a:endParaRPr lang="en-US" sz="1000">
+                        <a:effectLst/>
+                        <a:latin typeface="Calibri" panose="020F0502020204030204" pitchFamily="34" charset="0"/>
+                        <a:ea typeface="Calibri" panose="020F0502020204030204" pitchFamily="34" charset="0"/>
+                        <a:cs typeface="Times New Roman" panose="02020603050405020304" pitchFamily="18" charset="0"/>
+                      </a:endParaRPr>
+                    </a:p>
+                  </a:txBody>
+                  <a:tcPr marL="54349" marR="54349" marT="0" marB="0"/>
+                </a:tc>
+                <a:tc>
+                  <a:txBody>
+                    <a:bodyPr/>
+                    <a:lstStyle/>
+                    <a:p>
+                      <a:pPr marL="0" marR="0">
+                        <a:spcBef>
+                          <a:spcPts val="0"/>
+                        </a:spcBef>
+                        <a:spcAft>
+                          <a:spcPts val="0"/>
+                        </a:spcAft>
+                      </a:pPr>
+                      <a:r>
+                        <a:rPr lang="en-US" sz="1000" dirty="0">
+                          <a:effectLst/>
+                        </a:rPr>
+                        <a:t>Look at your tasks during the weekend prior to the start of the sprint, knowing what you have to work on early can let you know if you need to study and read prior to starting the sprint or before planning. Asks about potential resources and keep known ones favorite in your browser. </a:t>
+                      </a:r>
+                      <a:endParaRPr lang="en-US" sz="1000" dirty="0">
+                        <a:effectLst/>
+                        <a:latin typeface="Calibri" panose="020F0502020204030204" pitchFamily="34" charset="0"/>
+                        <a:ea typeface="Calibri" panose="020F0502020204030204" pitchFamily="34" charset="0"/>
+                        <a:cs typeface="Times New Roman" panose="02020603050405020304" pitchFamily="18" charset="0"/>
+                      </a:endParaRPr>
+                    </a:p>
+                  </a:txBody>
+                  <a:tcPr marL="54349" marR="54349" marT="0" marB="0"/>
+                </a:tc>
+                <a:extLst>
+                  <a:ext uri="{0D108BD9-81ED-4DB2-BD59-A6C34878D82A}">
+                    <a16:rowId xmlns:a16="http://schemas.microsoft.com/office/drawing/2014/main" val="1878788501"/>
+                  </a:ext>
+                </a:extLst>
+              </a:tr>
+            </a:tbl>
+          </a:graphicData>
+        </a:graphic>
+      </p:graphicFrame>
+    </p:spTree>
+  </p:cSld>
+  <p:clrMapOvr>
+    <a:masterClrMapping/>
+  </p:clrMapOvr>
+</p:sld>
+</file>
+
+<file path=ppt/slides/slide11.xml><?xml version="1.0" encoding="utf-8"?>
+<p:sld xmlns:a="http://schemas.openxmlformats.org/drawingml/2006/main" xmlns:r="http://schemas.openxmlformats.org/officeDocument/2006/relationships" xmlns:p="http://schemas.openxmlformats.org/presentationml/2006/main">
+  <p:cSld>
+    <p:spTree>
+      <p:nvGrpSpPr>
+        <p:cNvPr id="1" name=""/>
+        <p:cNvGrpSpPr/>
+        <p:nvPr/>
+      </p:nvGrpSpPr>
+      <p:grpSpPr>
+        <a:xfrm>
+          <a:off x="0" y="0"/>
+          <a:ext cx="0" cy="0"/>
+          <a:chOff x="0" y="0"/>
+          <a:chExt cx="0" cy="0"/>
+        </a:xfrm>
+      </p:grpSpPr>
+      <p:sp>
+        <p:nvSpPr>
+          <p:cNvPr id="2" name="Title 1"/>
+          <p:cNvSpPr>
+            <a:spLocks noGrp="1"/>
+          </p:cNvSpPr>
+          <p:nvPr>
+            <p:ph type="title"/>
+          </p:nvPr>
+        </p:nvSpPr>
+        <p:spPr>
+          <a:xfrm>
+            <a:off x="457200" y="320040"/>
+            <a:ext cx="7239000" cy="518160"/>
+          </a:xfrm>
+        </p:spPr>
+        <p:txBody>
+          <a:bodyPr>
+            <a:normAutofit fontScale="90000"/>
+          </a:bodyPr>
+          <a:lstStyle/>
+          <a:p>
+            <a:r>
+              <a:rPr lang="en-US" dirty="0"/>
+              <a:t>Risks Continued</a:t>
+            </a:r>
+          </a:p>
+        </p:txBody>
+      </p:sp>
+      <p:graphicFrame>
+        <p:nvGraphicFramePr>
+          <p:cNvPr id="5" name="Content Placeholder 4">
+            <a:extLst>
+              <a:ext uri="{FF2B5EF4-FFF2-40B4-BE49-F238E27FC236}">
+                <a16:creationId xmlns:a16="http://schemas.microsoft.com/office/drawing/2014/main" id="{D90AF8D3-9E2C-44FD-8BAD-7B7982F9C08E}"/>
+              </a:ext>
+            </a:extLst>
+          </p:cNvPr>
+          <p:cNvGraphicFramePr>
+            <a:graphicFrameLocks noGrp="1"/>
+          </p:cNvGraphicFramePr>
+          <p:nvPr>
+            <p:ph idx="1"/>
+            <p:extLst>
+              <p:ext uri="{D42A27DB-BD31-4B8C-83A1-F6EECF244321}">
+                <p14:modId xmlns:p14="http://schemas.microsoft.com/office/powerpoint/2010/main" val="3336043837"/>
+              </p:ext>
+            </p:extLst>
+          </p:nvPr>
+        </p:nvGraphicFramePr>
+        <p:xfrm>
+          <a:off x="457200" y="838201"/>
+          <a:ext cx="7239000" cy="5852160"/>
+        </p:xfrm>
+        <a:graphic>
+          <a:graphicData uri="http://schemas.openxmlformats.org/drawingml/2006/table">
+            <a:tbl>
+              <a:tblPr bandRow="1">
+                <a:tableStyleId>{5C22544A-7EE6-4342-B048-85BDC9FD1C3A}</a:tableStyleId>
+              </a:tblPr>
+              <a:tblGrid>
+                <a:gridCol w="1809498">
+                  <a:extLst>
+                    <a:ext uri="{9D8B030D-6E8A-4147-A177-3AD203B41FA5}">
+                      <a16:colId xmlns:a16="http://schemas.microsoft.com/office/drawing/2014/main" val="2592429754"/>
+                    </a:ext>
+                  </a:extLst>
+                </a:gridCol>
+                <a:gridCol w="1809498">
+                  <a:extLst>
+                    <a:ext uri="{9D8B030D-6E8A-4147-A177-3AD203B41FA5}">
+                      <a16:colId xmlns:a16="http://schemas.microsoft.com/office/drawing/2014/main" val="3809378308"/>
+                    </a:ext>
+                  </a:extLst>
+                </a:gridCol>
+                <a:gridCol w="1810002">
+                  <a:extLst>
+                    <a:ext uri="{9D8B030D-6E8A-4147-A177-3AD203B41FA5}">
+                      <a16:colId xmlns:a16="http://schemas.microsoft.com/office/drawing/2014/main" val="3618545182"/>
+                    </a:ext>
+                  </a:extLst>
+                </a:gridCol>
+                <a:gridCol w="1810002">
+                  <a:extLst>
+                    <a:ext uri="{9D8B030D-6E8A-4147-A177-3AD203B41FA5}">
+                      <a16:colId xmlns:a16="http://schemas.microsoft.com/office/drawing/2014/main" val="152360603"/>
+                    </a:ext>
+                  </a:extLst>
+                </a:gridCol>
+              </a:tblGrid>
+              <a:tr h="1393031">
+                <a:tc>
+                  <a:txBody>
+                    <a:bodyPr/>
+                    <a:lstStyle/>
+                    <a:p>
+                      <a:pPr marL="0" marR="0">
+                        <a:spcBef>
+                          <a:spcPts val="0"/>
+                        </a:spcBef>
+                        <a:spcAft>
+                          <a:spcPts val="0"/>
+                        </a:spcAft>
+                      </a:pPr>
+                      <a:r>
+                        <a:rPr lang="en-US" sz="1200" dirty="0">
+                          <a:solidFill>
+                            <a:srgbClr val="000000"/>
+                          </a:solidFill>
+                          <a:effectLst/>
+                          <a:latin typeface="Times New Roman" panose="02020603050405020304" pitchFamily="18" charset="0"/>
+                          <a:ea typeface="Times New Roman" panose="02020603050405020304" pitchFamily="18" charset="0"/>
+                          <a:cs typeface="Times New Roman" panose="02020603050405020304" pitchFamily="18" charset="0"/>
+                        </a:rPr>
+                        <a:t>Tool failure</a:t>
+                      </a:r>
+                      <a:endParaRPr lang="en-US" sz="1200" dirty="0">
+                        <a:effectLst/>
+                        <a:latin typeface="Calibri" panose="020F0502020204030204" pitchFamily="34" charset="0"/>
+                        <a:ea typeface="Calibri" panose="020F0502020204030204" pitchFamily="34" charset="0"/>
+                        <a:cs typeface="Times New Roman" panose="02020603050405020304" pitchFamily="18" charset="0"/>
+                      </a:endParaRPr>
+                    </a:p>
+                  </a:txBody>
+                  <a:tcPr marL="68580" marR="68580" marT="0" marB="0"/>
+                </a:tc>
+                <a:tc>
+                  <a:txBody>
+                    <a:bodyPr/>
+                    <a:lstStyle/>
+                    <a:p>
+                      <a:pPr marL="0" marR="0">
+                        <a:spcBef>
+                          <a:spcPts val="0"/>
+                        </a:spcBef>
+                        <a:spcAft>
+                          <a:spcPts val="0"/>
+                        </a:spcAft>
+                      </a:pPr>
+                      <a:r>
+                        <a:rPr lang="en-US" sz="1200">
+                          <a:solidFill>
+                            <a:srgbClr val="000000"/>
+                          </a:solidFill>
+                          <a:effectLst/>
+                          <a:latin typeface="Times New Roman" panose="02020603050405020304" pitchFamily="18" charset="0"/>
+                          <a:ea typeface="Times New Roman" panose="02020603050405020304" pitchFamily="18" charset="0"/>
+                          <a:cs typeface="Times New Roman" panose="02020603050405020304" pitchFamily="18" charset="0"/>
+                        </a:rPr>
+                        <a:t>The tools we are using could fail. It is not likely and low risk, but anything that can go wrong, will. </a:t>
+                      </a:r>
+                      <a:endParaRPr lang="en-US" sz="1200">
+                        <a:effectLst/>
+                        <a:latin typeface="Calibri" panose="020F0502020204030204" pitchFamily="34" charset="0"/>
+                        <a:ea typeface="Calibri" panose="020F0502020204030204" pitchFamily="34" charset="0"/>
+                        <a:cs typeface="Times New Roman" panose="02020603050405020304" pitchFamily="18" charset="0"/>
+                      </a:endParaRPr>
+                    </a:p>
+                  </a:txBody>
+                  <a:tcPr marL="68580" marR="68580" marT="0" marB="0"/>
+                </a:tc>
+                <a:tc>
+                  <a:txBody>
+                    <a:bodyPr/>
+                    <a:lstStyle/>
+                    <a:p>
+                      <a:pPr marL="0" marR="0">
+                        <a:spcBef>
+                          <a:spcPts val="0"/>
+                        </a:spcBef>
+                        <a:spcAft>
+                          <a:spcPts val="0"/>
+                        </a:spcAft>
+                      </a:pPr>
+                      <a:r>
+                        <a:rPr lang="en-US" sz="1200">
+                          <a:solidFill>
+                            <a:srgbClr val="000000"/>
+                          </a:solidFill>
+                          <a:effectLst/>
+                          <a:latin typeface="Times New Roman" panose="02020603050405020304" pitchFamily="18" charset="0"/>
+                          <a:ea typeface="Times New Roman" panose="02020603050405020304" pitchFamily="18" charset="0"/>
+                          <a:cs typeface="Times New Roman" panose="02020603050405020304" pitchFamily="18" charset="0"/>
+                        </a:rPr>
+                        <a:t>Keep up to date with the environments, have everything loaded, and play with the environment ahead of development. </a:t>
+                      </a:r>
+                      <a:endParaRPr lang="en-US" sz="1200">
+                        <a:effectLst/>
+                        <a:latin typeface="Calibri" panose="020F0502020204030204" pitchFamily="34" charset="0"/>
+                        <a:ea typeface="Calibri" panose="020F0502020204030204" pitchFamily="34" charset="0"/>
+                        <a:cs typeface="Times New Roman" panose="02020603050405020304" pitchFamily="18" charset="0"/>
+                      </a:endParaRPr>
+                    </a:p>
+                  </a:txBody>
+                  <a:tcPr marL="68580" marR="68580" marT="0" marB="0"/>
+                </a:tc>
+                <a:tc>
+                  <a:txBody>
+                    <a:bodyPr/>
+                    <a:lstStyle/>
+                    <a:p>
+                      <a:pPr marL="0" marR="0">
+                        <a:spcBef>
+                          <a:spcPts val="0"/>
+                        </a:spcBef>
+                        <a:spcAft>
+                          <a:spcPts val="0"/>
+                        </a:spcAft>
+                      </a:pPr>
+                      <a:r>
+                        <a:rPr lang="en-US" sz="1200">
+                          <a:solidFill>
+                            <a:srgbClr val="000000"/>
+                          </a:solidFill>
+                          <a:effectLst/>
+                          <a:latin typeface="Times New Roman" panose="02020603050405020304" pitchFamily="18" charset="0"/>
+                          <a:ea typeface="Times New Roman" panose="02020603050405020304" pitchFamily="18" charset="0"/>
+                          <a:cs typeface="Times New Roman" panose="02020603050405020304" pitchFamily="18" charset="0"/>
+                        </a:rPr>
+                        <a:t>This may be unavoidable if it does happen. However, keep your environment up to date, and make sure they are installed correctly. If you run into an issue, ask the team how they are set up to avoid it. </a:t>
+                      </a:r>
+                      <a:endParaRPr lang="en-US" sz="1200">
+                        <a:effectLst/>
+                        <a:latin typeface="Calibri" panose="020F0502020204030204" pitchFamily="34" charset="0"/>
+                        <a:ea typeface="Calibri" panose="020F0502020204030204" pitchFamily="34" charset="0"/>
+                        <a:cs typeface="Times New Roman" panose="02020603050405020304" pitchFamily="18" charset="0"/>
+                      </a:endParaRPr>
+                    </a:p>
+                  </a:txBody>
+                  <a:tcPr marL="68580" marR="68580" marT="0" marB="0"/>
+                </a:tc>
+                <a:extLst>
+                  <a:ext uri="{0D108BD9-81ED-4DB2-BD59-A6C34878D82A}">
+                    <a16:rowId xmlns:a16="http://schemas.microsoft.com/office/drawing/2014/main" val="2860719083"/>
+                  </a:ext>
+                </a:extLst>
+              </a:tr>
+              <a:tr h="1547813">
+                <a:tc>
+                  <a:txBody>
+                    <a:bodyPr/>
+                    <a:lstStyle/>
+                    <a:p>
+                      <a:pPr marL="0" marR="0">
+                        <a:spcBef>
+                          <a:spcPts val="0"/>
+                        </a:spcBef>
+                        <a:spcAft>
+                          <a:spcPts val="0"/>
+                        </a:spcAft>
+                      </a:pPr>
+                      <a:r>
+                        <a:rPr lang="en-US" sz="1200" dirty="0">
+                          <a:solidFill>
+                            <a:srgbClr val="000000"/>
+                          </a:solidFill>
+                          <a:effectLst/>
+                          <a:latin typeface="Times New Roman" panose="02020603050405020304" pitchFamily="18" charset="0"/>
+                          <a:ea typeface="Times New Roman" panose="02020603050405020304" pitchFamily="18" charset="0"/>
+                          <a:cs typeface="Times New Roman" panose="02020603050405020304" pitchFamily="18" charset="0"/>
+                        </a:rPr>
+                        <a:t>School Assignments</a:t>
+                      </a:r>
+                      <a:endParaRPr lang="en-US" sz="1200" dirty="0">
+                        <a:effectLst/>
+                        <a:latin typeface="Calibri" panose="020F0502020204030204" pitchFamily="34" charset="0"/>
+                        <a:ea typeface="Calibri" panose="020F0502020204030204" pitchFamily="34" charset="0"/>
+                        <a:cs typeface="Times New Roman" panose="02020603050405020304" pitchFamily="18" charset="0"/>
+                      </a:endParaRPr>
+                    </a:p>
+                  </a:txBody>
+                  <a:tcPr marL="68580" marR="68580" marT="0" marB="0"/>
+                </a:tc>
+                <a:tc>
+                  <a:txBody>
+                    <a:bodyPr/>
+                    <a:lstStyle/>
+                    <a:p>
+                      <a:pPr marL="0" marR="0">
+                        <a:spcBef>
+                          <a:spcPts val="0"/>
+                        </a:spcBef>
+                        <a:spcAft>
+                          <a:spcPts val="0"/>
+                        </a:spcAft>
+                      </a:pPr>
+                      <a:r>
+                        <a:rPr lang="en-US" sz="1200" dirty="0">
+                          <a:solidFill>
+                            <a:srgbClr val="000000"/>
+                          </a:solidFill>
+                          <a:effectLst/>
+                          <a:latin typeface="Times New Roman" panose="02020603050405020304" pitchFamily="18" charset="0"/>
+                          <a:ea typeface="Times New Roman" panose="02020603050405020304" pitchFamily="18" charset="0"/>
+                          <a:cs typeface="Times New Roman" panose="02020603050405020304" pitchFamily="18" charset="0"/>
+                        </a:rPr>
+                        <a:t>Since we are having to learn these skills as we go, and have individual assignments with no direct instruction, the individual assignments take longer than in other courses. This takes more time for us to work on, and pushes project development back</a:t>
+                      </a:r>
+                      <a:endParaRPr lang="en-US" sz="1200" dirty="0">
+                        <a:effectLst/>
+                        <a:latin typeface="Calibri" panose="020F0502020204030204" pitchFamily="34" charset="0"/>
+                        <a:ea typeface="Calibri" panose="020F0502020204030204" pitchFamily="34" charset="0"/>
+                        <a:cs typeface="Times New Roman" panose="02020603050405020304" pitchFamily="18" charset="0"/>
+                      </a:endParaRPr>
+                    </a:p>
+                  </a:txBody>
+                  <a:tcPr marL="68580" marR="68580" marT="0" marB="0"/>
+                </a:tc>
+                <a:tc>
+                  <a:txBody>
+                    <a:bodyPr/>
+                    <a:lstStyle/>
+                    <a:p>
+                      <a:pPr marL="0" marR="0">
+                        <a:spcBef>
+                          <a:spcPts val="0"/>
+                        </a:spcBef>
+                        <a:spcAft>
+                          <a:spcPts val="0"/>
+                        </a:spcAft>
+                      </a:pPr>
+                      <a:r>
+                        <a:rPr lang="en-US" sz="1200" dirty="0">
+                          <a:solidFill>
+                            <a:srgbClr val="000000"/>
+                          </a:solidFill>
+                          <a:effectLst/>
+                          <a:latin typeface="Times New Roman" panose="02020603050405020304" pitchFamily="18" charset="0"/>
+                          <a:ea typeface="Times New Roman" panose="02020603050405020304" pitchFamily="18" charset="0"/>
+                          <a:cs typeface="Times New Roman" panose="02020603050405020304" pitchFamily="18" charset="0"/>
+                        </a:rPr>
+                        <a:t>Starting work earlier in the week helps to buy some extra time towards the end of the week.</a:t>
+                      </a:r>
+                      <a:endParaRPr lang="en-US" sz="1200" dirty="0">
+                        <a:effectLst/>
+                        <a:latin typeface="Calibri" panose="020F0502020204030204" pitchFamily="34" charset="0"/>
+                        <a:ea typeface="Calibri" panose="020F0502020204030204" pitchFamily="34" charset="0"/>
+                        <a:cs typeface="Times New Roman" panose="02020603050405020304" pitchFamily="18" charset="0"/>
+                      </a:endParaRPr>
+                    </a:p>
+                  </a:txBody>
+                  <a:tcPr marL="68580" marR="68580" marT="0" marB="0"/>
+                </a:tc>
+                <a:tc>
+                  <a:txBody>
+                    <a:bodyPr/>
+                    <a:lstStyle/>
+                    <a:p>
+                      <a:pPr marL="0" marR="0">
+                        <a:spcBef>
+                          <a:spcPts val="0"/>
+                        </a:spcBef>
+                        <a:spcAft>
+                          <a:spcPts val="0"/>
+                        </a:spcAft>
+                      </a:pPr>
+                      <a:r>
+                        <a:rPr lang="en-US" sz="1200">
+                          <a:solidFill>
+                            <a:srgbClr val="000000"/>
+                          </a:solidFill>
+                          <a:effectLst/>
+                          <a:latin typeface="Times New Roman" panose="02020603050405020304" pitchFamily="18" charset="0"/>
+                          <a:ea typeface="Times New Roman" panose="02020603050405020304" pitchFamily="18" charset="0"/>
+                          <a:cs typeface="Times New Roman" panose="02020603050405020304" pitchFamily="18" charset="0"/>
+                        </a:rPr>
+                        <a:t>Long term getting ahead and keeping to the overall set schedules will help to buy back time. </a:t>
+                      </a:r>
+                      <a:endParaRPr lang="en-US" sz="1200">
+                        <a:effectLst/>
+                        <a:latin typeface="Calibri" panose="020F0502020204030204" pitchFamily="34" charset="0"/>
+                        <a:ea typeface="Calibri" panose="020F0502020204030204" pitchFamily="34" charset="0"/>
+                        <a:cs typeface="Times New Roman" panose="02020603050405020304" pitchFamily="18" charset="0"/>
+                      </a:endParaRPr>
+                    </a:p>
+                  </a:txBody>
+                  <a:tcPr marL="68580" marR="68580" marT="0" marB="0"/>
+                </a:tc>
+                <a:extLst>
+                  <a:ext uri="{0D108BD9-81ED-4DB2-BD59-A6C34878D82A}">
+                    <a16:rowId xmlns:a16="http://schemas.microsoft.com/office/drawing/2014/main" val="2772022293"/>
+                  </a:ext>
+                </a:extLst>
+              </a:tr>
+              <a:tr h="2012156">
+                <a:tc>
+                  <a:txBody>
+                    <a:bodyPr/>
+                    <a:lstStyle/>
+                    <a:p>
+                      <a:pPr marL="0" marR="0">
+                        <a:spcBef>
+                          <a:spcPts val="0"/>
+                        </a:spcBef>
+                        <a:spcAft>
+                          <a:spcPts val="0"/>
+                        </a:spcAft>
+                      </a:pPr>
+                      <a:r>
+                        <a:rPr lang="en-US" sz="1200">
+                          <a:solidFill>
+                            <a:srgbClr val="000000"/>
+                          </a:solidFill>
+                          <a:effectLst/>
+                          <a:latin typeface="Times New Roman" panose="02020603050405020304" pitchFamily="18" charset="0"/>
+                          <a:ea typeface="Times New Roman" panose="02020603050405020304" pitchFamily="18" charset="0"/>
+                          <a:cs typeface="Times New Roman" panose="02020603050405020304" pitchFamily="18" charset="0"/>
+                        </a:rPr>
+                        <a:t>Work</a:t>
+                      </a:r>
+                      <a:endParaRPr lang="en-US" sz="1200">
+                        <a:effectLst/>
+                        <a:latin typeface="Calibri" panose="020F0502020204030204" pitchFamily="34" charset="0"/>
+                        <a:ea typeface="Calibri" panose="020F0502020204030204" pitchFamily="34" charset="0"/>
+                        <a:cs typeface="Times New Roman" panose="02020603050405020304" pitchFamily="18" charset="0"/>
+                      </a:endParaRPr>
+                    </a:p>
+                  </a:txBody>
+                  <a:tcPr marL="68580" marR="68580" marT="0" marB="0"/>
+                </a:tc>
+                <a:tc>
+                  <a:txBody>
+                    <a:bodyPr/>
+                    <a:lstStyle/>
+                    <a:p>
+                      <a:pPr marL="0" marR="0">
+                        <a:spcBef>
+                          <a:spcPts val="0"/>
+                        </a:spcBef>
+                        <a:spcAft>
+                          <a:spcPts val="0"/>
+                        </a:spcAft>
+                      </a:pPr>
+                      <a:r>
+                        <a:rPr lang="en-US" sz="1200">
+                          <a:solidFill>
+                            <a:srgbClr val="000000"/>
+                          </a:solidFill>
+                          <a:effectLst/>
+                          <a:latin typeface="Times New Roman" panose="02020603050405020304" pitchFamily="18" charset="0"/>
+                          <a:ea typeface="Times New Roman" panose="02020603050405020304" pitchFamily="18" charset="0"/>
+                          <a:cs typeface="Times New Roman" panose="02020603050405020304" pitchFamily="18" charset="0"/>
+                        </a:rPr>
+                        <a:t>Some of us work full time, and or part time, that consumes a majority of the day and an individual’s energy. Class is added pressure to someone who works, and class is secondary to making a living, if someone has to choose between making a grade and paying bills it’s obvious what someone will choose. </a:t>
+                      </a:r>
+                      <a:endParaRPr lang="en-US" sz="1200">
+                        <a:effectLst/>
+                        <a:latin typeface="Calibri" panose="020F0502020204030204" pitchFamily="34" charset="0"/>
+                        <a:ea typeface="Calibri" panose="020F0502020204030204" pitchFamily="34" charset="0"/>
+                        <a:cs typeface="Times New Roman" panose="02020603050405020304" pitchFamily="18" charset="0"/>
+                      </a:endParaRPr>
+                    </a:p>
+                  </a:txBody>
+                  <a:tcPr marL="68580" marR="68580" marT="0" marB="0"/>
+                </a:tc>
+                <a:tc>
+                  <a:txBody>
+                    <a:bodyPr/>
+                    <a:lstStyle/>
+                    <a:p>
+                      <a:pPr marL="0" marR="0">
+                        <a:spcBef>
+                          <a:spcPts val="0"/>
+                        </a:spcBef>
+                        <a:spcAft>
+                          <a:spcPts val="0"/>
+                        </a:spcAft>
+                      </a:pPr>
+                      <a:r>
+                        <a:rPr lang="en-US" sz="1200" dirty="0">
+                          <a:solidFill>
+                            <a:srgbClr val="000000"/>
+                          </a:solidFill>
+                          <a:effectLst/>
+                          <a:latin typeface="Times New Roman" panose="02020603050405020304" pitchFamily="18" charset="0"/>
+                          <a:ea typeface="Times New Roman" panose="02020603050405020304" pitchFamily="18" charset="0"/>
+                          <a:cs typeface="Times New Roman" panose="02020603050405020304" pitchFamily="18" charset="0"/>
+                        </a:rPr>
+                        <a:t>Keeping a schedule to separate work from school, to avoid burnout. Let your boss know that you are in school and the scope of the project being taken on to complete the course. </a:t>
+                      </a:r>
+                      <a:endParaRPr lang="en-US" sz="1200" dirty="0">
+                        <a:effectLst/>
+                        <a:latin typeface="Calibri" panose="020F0502020204030204" pitchFamily="34" charset="0"/>
+                        <a:ea typeface="Calibri" panose="020F0502020204030204" pitchFamily="34" charset="0"/>
+                        <a:cs typeface="Times New Roman" panose="02020603050405020304" pitchFamily="18" charset="0"/>
+                      </a:endParaRPr>
+                    </a:p>
+                  </a:txBody>
+                  <a:tcPr marL="68580" marR="68580" marT="0" marB="0"/>
+                </a:tc>
+                <a:tc>
+                  <a:txBody>
+                    <a:bodyPr/>
+                    <a:lstStyle/>
+                    <a:p>
+                      <a:pPr marL="0" marR="0">
+                        <a:spcBef>
+                          <a:spcPts val="0"/>
+                        </a:spcBef>
+                        <a:spcAft>
+                          <a:spcPts val="0"/>
+                        </a:spcAft>
+                      </a:pPr>
+                      <a:r>
+                        <a:rPr lang="en-US" sz="1200" dirty="0">
+                          <a:solidFill>
+                            <a:srgbClr val="000000"/>
+                          </a:solidFill>
+                          <a:effectLst/>
+                          <a:latin typeface="Times New Roman" panose="02020603050405020304" pitchFamily="18" charset="0"/>
+                          <a:ea typeface="Times New Roman" panose="02020603050405020304" pitchFamily="18" charset="0"/>
+                          <a:cs typeface="Times New Roman" panose="02020603050405020304" pitchFamily="18" charset="0"/>
+                        </a:rPr>
+                        <a:t>Let the team know if you have a job. Plan out your week for yourself, and do not wait till the end of the week to work on your portion. Inform your boss that you may need a lighter workload if you need work time to get things done. </a:t>
+                      </a:r>
+                      <a:endParaRPr lang="en-US" sz="1200" dirty="0">
+                        <a:effectLst/>
+                        <a:latin typeface="Calibri" panose="020F0502020204030204" pitchFamily="34" charset="0"/>
+                        <a:ea typeface="Calibri" panose="020F0502020204030204" pitchFamily="34" charset="0"/>
+                        <a:cs typeface="Times New Roman" panose="02020603050405020304" pitchFamily="18" charset="0"/>
+                      </a:endParaRPr>
+                    </a:p>
+                  </a:txBody>
+                  <a:tcPr marL="68580" marR="68580" marT="0" marB="0"/>
+                </a:tc>
+                <a:extLst>
+                  <a:ext uri="{0D108BD9-81ED-4DB2-BD59-A6C34878D82A}">
+                    <a16:rowId xmlns:a16="http://schemas.microsoft.com/office/drawing/2014/main" val="1705593883"/>
+                  </a:ext>
+                </a:extLst>
+              </a:tr>
+            </a:tbl>
+          </a:graphicData>
+        </a:graphic>
+      </p:graphicFrame>
+    </p:spTree>
+    <p:extLst>
+      <p:ext uri="{BB962C8B-B14F-4D97-AF65-F5344CB8AC3E}">
+        <p14:creationId xmlns:p14="http://schemas.microsoft.com/office/powerpoint/2010/main" val="2811163133"/>
+      </p:ext>
+    </p:extLst>
+  </p:cSld>
+  <p:clrMapOvr>
+    <a:masterClrMapping/>
+  </p:clrMapOvr>
+</p:sld>
+</file>
+
+<file path=ppt/slides/slide12.xml><?xml version="1.0" encoding="utf-8"?>
+<p:sld xmlns:a="http://schemas.openxmlformats.org/drawingml/2006/main" xmlns:r="http://schemas.openxmlformats.org/officeDocument/2006/relationships" xmlns:p="http://schemas.openxmlformats.org/presentationml/2006/main">
+  <p:cSld>
+    <p:spTree>
+      <p:nvGrpSpPr>
+        <p:cNvPr id="1" name=""/>
+        <p:cNvGrpSpPr/>
+        <p:nvPr/>
+      </p:nvGrpSpPr>
+      <p:grpSpPr>
+        <a:xfrm>
+          <a:off x="0" y="0"/>
+          <a:ext cx="0" cy="0"/>
+          <a:chOff x="0" y="0"/>
+          <a:chExt cx="0" cy="0"/>
+        </a:xfrm>
+      </p:grpSpPr>
+      <p:sp>
+        <p:nvSpPr>
           <p:cNvPr id="4" name="Title 3"/>
           <p:cNvSpPr>
             <a:spLocks noGrp="1"/>
@@ -5439,7 +6461,7 @@
 </p:sld>
 </file>
 
-<file path=ppt/slides/slide11.xml><?xml version="1.0" encoding="utf-8"?>
+<file path=ppt/slides/slide13.xml><?xml version="1.0" encoding="utf-8"?>
 <p:sld xmlns:a="http://schemas.openxmlformats.org/drawingml/2006/main" xmlns:r="http://schemas.openxmlformats.org/officeDocument/2006/relationships" xmlns:p="http://schemas.openxmlformats.org/presentationml/2006/main">
   <p:cSld>
     <p:spTree>
@@ -5556,7 +6578,7 @@
 </p:sld>
 </file>
 
-<file path=ppt/slides/slide12.xml><?xml version="1.0" encoding="utf-8"?>
+<file path=ppt/slides/slide14.xml><?xml version="1.0" encoding="utf-8"?>
 <p:sld xmlns:a="http://schemas.openxmlformats.org/drawingml/2006/main" xmlns:r="http://schemas.openxmlformats.org/officeDocument/2006/relationships" xmlns:p="http://schemas.openxmlformats.org/presentationml/2006/main">
   <p:cSld>
     <p:spTree>
@@ -5608,65 +6630,443 @@
         <p:spPr/>
         <p:txBody>
           <a:bodyPr>
-            <a:normAutofit fontScale="70000" lnSpcReduction="20000"/>
+            <a:normAutofit fontScale="47500" lnSpcReduction="20000"/>
           </a:bodyPr>
           <a:lstStyle/>
           <a:p>
-            <a:r>
-              <a:rPr lang="en-US" dirty="0"/>
-              <a:t>Almeida, D. A., Murphy, G. C., Wilson, G., &amp; </a:t>
-            </a:r>
-            <a:r>
-              <a:rPr lang="en-US" dirty="0" err="1"/>
-              <a:t>Hoye</a:t>
-            </a:r>
-            <a:r>
-              <a:rPr lang="en-US" dirty="0"/>
-              <a:t>, M. (2017). Do Software Developers Understand Open Source Licenses? </a:t>
-            </a:r>
-            <a:r>
-              <a:rPr lang="en-US" i="1" dirty="0"/>
-              <a:t>2017 IEEE/ACM 25th International Conference on Program Comprehension (ICPC)</a:t>
-            </a:r>
-            <a:r>
-              <a:rPr lang="en-US" dirty="0"/>
-              <a:t>. DOI: 10.1109/icpc.2017.7 </a:t>
-            </a:r>
-          </a:p>
-          <a:p>
-            <a:r>
-              <a:rPr lang="en-US" dirty="0"/>
-              <a:t>Getting Started. (n.d.). Retrieved October 4, 2019, from https://apacheignite.readme.io/docs/getting-started. </a:t>
-            </a:r>
-          </a:p>
-          <a:p>
-            <a:r>
-              <a:rPr lang="en-US" dirty="0"/>
-              <a:t>Leroux, Sylvain. (2017). Open Source Licenses Comparison [Guide]. Retrieved from https://itsfoss.com/open-source-licenses-explained/ </a:t>
-            </a:r>
-          </a:p>
-          <a:p>
-            <a:r>
-              <a:rPr lang="en-US" dirty="0"/>
-              <a:t>Proven Use Cases for Apache Ignite™. (n.d.). Retrieved October 4, 2019, from http://ignite.apache.org/provenusecases.html </a:t>
-            </a:r>
-          </a:p>
-          <a:p>
-            <a:r>
-              <a:rPr lang="en-US" dirty="0"/>
-              <a:t>Rosen, L. E. (2004). Intellectual Property. In Open Source Licensing: Software Freedom and Intellectual Property Law. Upper Saddle River (N.J.): Prentice Hall. </a:t>
-            </a:r>
-          </a:p>
-          <a:p>
-            <a:r>
-              <a:rPr lang="en-US" dirty="0"/>
-              <a:t>Surratt W., Shimizu R., &amp; Garcia P. (2019). Documentation Deliverables, Grand Canyon University.</a:t>
-            </a:r>
-          </a:p>
-          <a:p>
-            <a:r>
-              <a:rPr lang="en-US" dirty="0"/>
-              <a:t>What is Ignite? (n.d.). Retrieved October 4, 2019, from https://apacheignite.readme.io/docs </a:t>
+            <a:pPr marL="360045" marR="0" indent="-360045"/>
+            <a:r>
+              <a:rPr lang="en-US" sz="1800" dirty="0" err="1">
+                <a:effectLst/>
+                <a:latin typeface="Times New Roman" panose="02020603050405020304" pitchFamily="18" charset="0"/>
+                <a:ea typeface="Times New Roman" panose="02020603050405020304" pitchFamily="18" charset="0"/>
+              </a:rPr>
+              <a:t>Ardalis</a:t>
+            </a:r>
+            <a:r>
+              <a:rPr lang="en-US" sz="1800" dirty="0">
+                <a:effectLst/>
+                <a:latin typeface="Times New Roman" panose="02020603050405020304" pitchFamily="18" charset="0"/>
+                <a:ea typeface="Times New Roman" panose="02020603050405020304" pitchFamily="18" charset="0"/>
+              </a:rPr>
+              <a:t>. (n.d.). Common web application architectures. Retrieved January 01, 2021, from https://docs.microsoft.com/en-us/dotnet/architecture/modern-web-apps-azure/common-web-application-architectures</a:t>
+            </a:r>
+          </a:p>
+          <a:p>
+            <a:pPr marL="356870" marR="0" indent="-356870">
+              <a:lnSpc>
+                <a:spcPct val="107000"/>
+              </a:lnSpc>
+              <a:spcBef>
+                <a:spcPts val="0"/>
+              </a:spcBef>
+              <a:spcAft>
+                <a:spcPts val="800"/>
+              </a:spcAft>
+            </a:pPr>
+            <a:r>
+              <a:rPr lang="en-US" sz="1800" dirty="0">
+                <a:effectLst/>
+                <a:latin typeface="Times New Roman" panose="02020603050405020304" pitchFamily="18" charset="0"/>
+                <a:ea typeface="Times New Roman" panose="02020603050405020304" pitchFamily="18" charset="0"/>
+                <a:cs typeface="Times New Roman" panose="02020603050405020304" pitchFamily="18" charset="0"/>
+              </a:rPr>
+              <a:t>ASP.NET MVC Tutorial. (n.d.). Retrieved January 03, 2021, from https://www.tutorialspoint.com/asp.net_mvc/index.htm</a:t>
+            </a:r>
+            <a:endParaRPr lang="en-US" sz="1800" dirty="0">
+              <a:effectLst/>
+              <a:latin typeface="Calibri" panose="020F0502020204030204" pitchFamily="34" charset="0"/>
+              <a:ea typeface="Calibri" panose="020F0502020204030204" pitchFamily="34" charset="0"/>
+              <a:cs typeface="Times New Roman" panose="02020603050405020304" pitchFamily="18" charset="0"/>
+            </a:endParaRPr>
+          </a:p>
+          <a:p>
+            <a:pPr marL="360045" marR="0" indent="-360045"/>
+            <a:r>
+              <a:rPr lang="en-US" sz="1800" i="1" dirty="0">
+                <a:effectLst/>
+                <a:latin typeface="Times New Roman" panose="02020603050405020304" pitchFamily="18" charset="0"/>
+                <a:ea typeface="Times New Roman" panose="02020603050405020304" pitchFamily="18" charset="0"/>
+              </a:rPr>
+              <a:t>ASP.NET Razor C# Syntax</a:t>
+            </a:r>
+            <a:r>
+              <a:rPr lang="en-US" sz="1800" dirty="0">
+                <a:effectLst/>
+                <a:latin typeface="Times New Roman" panose="02020603050405020304" pitchFamily="18" charset="0"/>
+                <a:ea typeface="Times New Roman" panose="02020603050405020304" pitchFamily="18" charset="0"/>
+              </a:rPr>
+              <a:t>. (n.d.). W3 Schools. Retrieved January 19, 2021, from </a:t>
+            </a:r>
+            <a:r>
+              <a:rPr lang="en-US" sz="1800" u="sng" dirty="0">
+                <a:solidFill>
+                  <a:srgbClr val="0563C1"/>
+                </a:solidFill>
+                <a:effectLst/>
+                <a:latin typeface="Times New Roman" panose="02020603050405020304" pitchFamily="18" charset="0"/>
+                <a:ea typeface="Times New Roman" panose="02020603050405020304" pitchFamily="18" charset="0"/>
+                <a:hlinkClick r:id="rId3"/>
+              </a:rPr>
+              <a:t>https://www.w3schools.com/asp/razor_syntax.asp</a:t>
+            </a:r>
+            <a:endParaRPr lang="en-US" sz="1800" dirty="0">
+              <a:effectLst/>
+              <a:latin typeface="Times New Roman" panose="02020603050405020304" pitchFamily="18" charset="0"/>
+              <a:ea typeface="Times New Roman" panose="02020603050405020304" pitchFamily="18" charset="0"/>
+            </a:endParaRPr>
+          </a:p>
+          <a:p>
+            <a:pPr marL="356870" marR="0" indent="-356870">
+              <a:lnSpc>
+                <a:spcPct val="107000"/>
+              </a:lnSpc>
+              <a:spcBef>
+                <a:spcPts val="0"/>
+              </a:spcBef>
+              <a:spcAft>
+                <a:spcPts val="800"/>
+              </a:spcAft>
+            </a:pPr>
+            <a:r>
+              <a:rPr lang="en-US" sz="1800" dirty="0">
+                <a:effectLst/>
+                <a:latin typeface="Times New Roman" panose="02020603050405020304" pitchFamily="18" charset="0"/>
+                <a:ea typeface="Times New Roman" panose="02020603050405020304" pitchFamily="18" charset="0"/>
+                <a:cs typeface="Times New Roman" panose="02020603050405020304" pitchFamily="18" charset="0"/>
+              </a:rPr>
+              <a:t>Dotnet-Bot. (n.d.). .NET API browser. Retrieved January 03, 2021, from https://docs.microsoft.com/en-us/dotnet/api/</a:t>
+            </a:r>
+            <a:endParaRPr lang="en-US" sz="1800" dirty="0">
+              <a:effectLst/>
+              <a:latin typeface="Calibri" panose="020F0502020204030204" pitchFamily="34" charset="0"/>
+              <a:ea typeface="Calibri" panose="020F0502020204030204" pitchFamily="34" charset="0"/>
+              <a:cs typeface="Times New Roman" panose="02020603050405020304" pitchFamily="18" charset="0"/>
+            </a:endParaRPr>
+          </a:p>
+          <a:p>
+            <a:pPr marL="360045" marR="0" indent="-360045"/>
+            <a:r>
+              <a:rPr lang="en-US" sz="1800" dirty="0" err="1">
+                <a:effectLst/>
+                <a:latin typeface="Times New Roman" panose="02020603050405020304" pitchFamily="18" charset="0"/>
+                <a:ea typeface="Times New Roman" panose="02020603050405020304" pitchFamily="18" charset="0"/>
+              </a:rPr>
+              <a:t>Drumond</a:t>
+            </a:r>
+            <a:r>
+              <a:rPr lang="en-US" sz="1800" dirty="0">
+                <a:effectLst/>
+                <a:latin typeface="Times New Roman" panose="02020603050405020304" pitchFamily="18" charset="0"/>
+                <a:ea typeface="Times New Roman" panose="02020603050405020304" pitchFamily="18" charset="0"/>
+              </a:rPr>
+              <a:t>, C. (n.d.). Scrum - what it is, how it works, and why it's awesome. Retrieved January 01, 2021, from </a:t>
+            </a:r>
+            <a:r>
+              <a:rPr lang="en-US" sz="1800" u="sng" dirty="0">
+                <a:solidFill>
+                  <a:srgbClr val="0563C1"/>
+                </a:solidFill>
+                <a:effectLst/>
+                <a:latin typeface="Times New Roman" panose="02020603050405020304" pitchFamily="18" charset="0"/>
+                <a:ea typeface="Times New Roman" panose="02020603050405020304" pitchFamily="18" charset="0"/>
+                <a:hlinkClick r:id="rId4"/>
+              </a:rPr>
+              <a:t>https://www.atlassian.com/agile/scrum</a:t>
+            </a:r>
+            <a:endParaRPr lang="en-US" sz="1800" dirty="0">
+              <a:effectLst/>
+              <a:latin typeface="Times New Roman" panose="02020603050405020304" pitchFamily="18" charset="0"/>
+              <a:ea typeface="Times New Roman" panose="02020603050405020304" pitchFamily="18" charset="0"/>
+            </a:endParaRPr>
+          </a:p>
+          <a:p>
+            <a:pPr marL="356870" marR="0" indent="-356870">
+              <a:lnSpc>
+                <a:spcPct val="107000"/>
+              </a:lnSpc>
+              <a:spcBef>
+                <a:spcPts val="0"/>
+              </a:spcBef>
+              <a:spcAft>
+                <a:spcPts val="800"/>
+              </a:spcAft>
+            </a:pPr>
+            <a:r>
+              <a:rPr lang="en-US" sz="1800" dirty="0">
+                <a:effectLst/>
+                <a:latin typeface="Times New Roman" panose="02020603050405020304" pitchFamily="18" charset="0"/>
+                <a:ea typeface="Times New Roman" panose="02020603050405020304" pitchFamily="18" charset="0"/>
+                <a:cs typeface="Times New Roman" panose="02020603050405020304" pitchFamily="18" charset="0"/>
+              </a:rPr>
+              <a:t>Friedman, J. (2016, June 07). ADO.NET Tutorial. Retrieved January 03, 2021, from http://csharp-station.com/Tutorial/AdoDotNet</a:t>
+            </a:r>
+            <a:endParaRPr lang="en-US" sz="1800" dirty="0">
+              <a:effectLst/>
+              <a:latin typeface="Calibri" panose="020F0502020204030204" pitchFamily="34" charset="0"/>
+              <a:ea typeface="Calibri" panose="020F0502020204030204" pitchFamily="34" charset="0"/>
+              <a:cs typeface="Times New Roman" panose="02020603050405020304" pitchFamily="18" charset="0"/>
+            </a:endParaRPr>
+          </a:p>
+          <a:p>
+            <a:pPr marL="356870" marR="0" indent="-356870">
+              <a:lnSpc>
+                <a:spcPct val="107000"/>
+              </a:lnSpc>
+              <a:spcBef>
+                <a:spcPts val="0"/>
+              </a:spcBef>
+              <a:spcAft>
+                <a:spcPts val="800"/>
+              </a:spcAft>
+            </a:pPr>
+            <a:r>
+              <a:rPr lang="en-US" sz="1800" dirty="0">
+                <a:effectLst/>
+                <a:latin typeface="Times New Roman" panose="02020603050405020304" pitchFamily="18" charset="0"/>
+                <a:ea typeface="Times New Roman" panose="02020603050405020304" pitchFamily="18" charset="0"/>
+                <a:cs typeface="Times New Roman" panose="02020603050405020304" pitchFamily="18" charset="0"/>
+              </a:rPr>
+              <a:t>Galloway, J., Wilson, B., Allen, K. S., &amp; Matson, D. (2014). In </a:t>
+            </a:r>
+            <a:r>
+              <a:rPr lang="en-US" sz="1800" i="1" dirty="0">
+                <a:effectLst/>
+                <a:latin typeface="Times New Roman" panose="02020603050405020304" pitchFamily="18" charset="0"/>
+                <a:ea typeface="Times New Roman" panose="02020603050405020304" pitchFamily="18" charset="0"/>
+                <a:cs typeface="Times New Roman" panose="02020603050405020304" pitchFamily="18" charset="0"/>
+              </a:rPr>
+              <a:t>Professional ASP.NET MVC 5</a:t>
+            </a:r>
+            <a:r>
+              <a:rPr lang="en-US" sz="1800" dirty="0">
+                <a:effectLst/>
+                <a:latin typeface="Times New Roman" panose="02020603050405020304" pitchFamily="18" charset="0"/>
+                <a:ea typeface="Times New Roman" panose="02020603050405020304" pitchFamily="18" charset="0"/>
+                <a:cs typeface="Times New Roman" panose="02020603050405020304" pitchFamily="18" charset="0"/>
+              </a:rPr>
+              <a:t> Indianapolis, IN: John Wiley &amp; Sons.</a:t>
+            </a:r>
+            <a:endParaRPr lang="en-US" sz="1800" dirty="0">
+              <a:effectLst/>
+              <a:latin typeface="Calibri" panose="020F0502020204030204" pitchFamily="34" charset="0"/>
+              <a:ea typeface="Calibri" panose="020F0502020204030204" pitchFamily="34" charset="0"/>
+              <a:cs typeface="Times New Roman" panose="02020603050405020304" pitchFamily="18" charset="0"/>
+            </a:endParaRPr>
+          </a:p>
+          <a:p>
+            <a:pPr marL="356870" marR="0" indent="-356870">
+              <a:lnSpc>
+                <a:spcPct val="107000"/>
+              </a:lnSpc>
+              <a:spcBef>
+                <a:spcPts val="0"/>
+              </a:spcBef>
+              <a:spcAft>
+                <a:spcPts val="800"/>
+              </a:spcAft>
+            </a:pPr>
+            <a:r>
+              <a:rPr lang="en-US" sz="1800" dirty="0" err="1">
+                <a:effectLst/>
+                <a:latin typeface="Times New Roman" panose="02020603050405020304" pitchFamily="18" charset="0"/>
+                <a:ea typeface="Times New Roman" panose="02020603050405020304" pitchFamily="18" charset="0"/>
+                <a:cs typeface="Times New Roman" panose="02020603050405020304" pitchFamily="18" charset="0"/>
+              </a:rPr>
+              <a:t>Matskas</a:t>
+            </a:r>
+            <a:r>
+              <a:rPr lang="en-US" sz="1800" dirty="0">
+                <a:effectLst/>
+                <a:latin typeface="Times New Roman" panose="02020603050405020304" pitchFamily="18" charset="0"/>
+                <a:ea typeface="Times New Roman" panose="02020603050405020304" pitchFamily="18" charset="0"/>
+                <a:cs typeface="Times New Roman" panose="02020603050405020304" pitchFamily="18" charset="0"/>
+              </a:rPr>
+              <a:t>, C., &amp; Marsh, K. (2020, December 18). Channel 9 provides videos for developers, delivered by the people who work behind the scenes at Microsoft. Retrieved January 03, 2021, from https://channel9.msdn.com/On-NET/What-is-MSAL--MicrosoftIdentityWeb</a:t>
+            </a:r>
+            <a:endParaRPr lang="en-US" sz="1800" dirty="0">
+              <a:effectLst/>
+              <a:latin typeface="Calibri" panose="020F0502020204030204" pitchFamily="34" charset="0"/>
+              <a:ea typeface="Calibri" panose="020F0502020204030204" pitchFamily="34" charset="0"/>
+              <a:cs typeface="Times New Roman" panose="02020603050405020304" pitchFamily="18" charset="0"/>
+            </a:endParaRPr>
+          </a:p>
+          <a:p>
+            <a:pPr marL="360045" marR="0" indent="-360045"/>
+            <a:r>
+              <a:rPr lang="en-US" sz="1800" dirty="0">
+                <a:effectLst/>
+                <a:latin typeface="Times New Roman" panose="02020603050405020304" pitchFamily="18" charset="0"/>
+                <a:ea typeface="Times New Roman" panose="02020603050405020304" pitchFamily="18" charset="0"/>
+              </a:rPr>
+              <a:t>Patel, P. (2014, February 24). Three Layer Architecture in C# .NET. Retrieved January 01, 2021, from https://www.codeproject.com/articles/36847/three-layer-architecture-in-c-net-2</a:t>
+            </a:r>
+          </a:p>
+          <a:p>
+            <a:pPr marL="356870" marR="0" indent="-356870">
+              <a:lnSpc>
+                <a:spcPct val="107000"/>
+              </a:lnSpc>
+              <a:spcBef>
+                <a:spcPts val="0"/>
+              </a:spcBef>
+              <a:spcAft>
+                <a:spcPts val="800"/>
+              </a:spcAft>
+            </a:pPr>
+            <a:r>
+              <a:rPr lang="en-US" sz="1800" dirty="0">
+                <a:effectLst/>
+                <a:latin typeface="Times New Roman" panose="02020603050405020304" pitchFamily="18" charset="0"/>
+                <a:ea typeface="Calibri" panose="020F0502020204030204" pitchFamily="34" charset="0"/>
+                <a:cs typeface="Times New Roman" panose="02020603050405020304" pitchFamily="18" charset="0"/>
+              </a:rPr>
+              <a:t>Rawat, A. (n.d.). Dependency injection in c#. Retrieved February 18, 2021, from https://www.c-sharpcorner.com/UploadFile/85ed7a/dependency-injection-in-C-Sharp/#:~:text=Dependency%20Injection%20helps%20to%20reduce,instead%20of%20design%20time%20technically.</a:t>
+            </a:r>
+            <a:endParaRPr lang="en-US" sz="1800" dirty="0">
+              <a:effectLst/>
+              <a:latin typeface="Calibri" panose="020F0502020204030204" pitchFamily="34" charset="0"/>
+              <a:ea typeface="Calibri" panose="020F0502020204030204" pitchFamily="34" charset="0"/>
+              <a:cs typeface="Times New Roman" panose="02020603050405020304" pitchFamily="18" charset="0"/>
+            </a:endParaRPr>
+          </a:p>
+          <a:p>
+            <a:pPr marL="360045" marR="0" indent="-360045"/>
+            <a:r>
+              <a:rPr lang="en-US" sz="1800" dirty="0" err="1">
+                <a:effectLst/>
+                <a:latin typeface="Times New Roman" panose="02020603050405020304" pitchFamily="18" charset="0"/>
+                <a:ea typeface="Times New Roman" panose="02020603050405020304" pitchFamily="18" charset="0"/>
+              </a:rPr>
+              <a:t>Schwaber</a:t>
+            </a:r>
+            <a:r>
+              <a:rPr lang="en-US" sz="1800" dirty="0">
+                <a:effectLst/>
+                <a:latin typeface="Times New Roman" panose="02020603050405020304" pitchFamily="18" charset="0"/>
+                <a:ea typeface="Times New Roman" panose="02020603050405020304" pitchFamily="18" charset="0"/>
+              </a:rPr>
+              <a:t>, K., &amp; Sutherland, J. (2020, November 18). The 2020 Scrum </a:t>
+            </a:r>
+            <a:r>
+              <a:rPr lang="en-US" sz="1800" dirty="0" err="1">
+                <a:effectLst/>
+                <a:latin typeface="Times New Roman" panose="02020603050405020304" pitchFamily="18" charset="0"/>
+                <a:ea typeface="Times New Roman" panose="02020603050405020304" pitchFamily="18" charset="0"/>
+              </a:rPr>
+              <a:t>GuideTM</a:t>
+            </a:r>
+            <a:r>
+              <a:rPr lang="en-US" sz="1800" dirty="0">
+                <a:effectLst/>
+                <a:latin typeface="Times New Roman" panose="02020603050405020304" pitchFamily="18" charset="0"/>
+                <a:ea typeface="Times New Roman" panose="02020603050405020304" pitchFamily="18" charset="0"/>
+              </a:rPr>
+              <a:t>. Retrieved January 01, 2021, from https://www.scrumguides.org/scrum-guide.html</a:t>
+            </a:r>
+          </a:p>
+          <a:p>
+            <a:pPr marL="360045" marR="0" indent="-360045"/>
+            <a:r>
+              <a:rPr lang="en-US" sz="1800" dirty="0" err="1">
+                <a:effectLst/>
+                <a:latin typeface="Times New Roman" panose="02020603050405020304" pitchFamily="18" charset="0"/>
+                <a:ea typeface="Times New Roman" panose="02020603050405020304" pitchFamily="18" charset="0"/>
+              </a:rPr>
+              <a:t>ShoJaee</a:t>
+            </a:r>
+            <a:r>
+              <a:rPr lang="en-US" sz="1800" dirty="0">
+                <a:effectLst/>
+                <a:latin typeface="Times New Roman" panose="02020603050405020304" pitchFamily="18" charset="0"/>
+                <a:ea typeface="Times New Roman" panose="02020603050405020304" pitchFamily="18" charset="0"/>
+              </a:rPr>
+              <a:t>, H. (2012, February 20). Intro to Scrum in Under 10 Minutes. Retrieved January 01, 2021, from https://www.youtube.com/watch?v=XU0llRltyFM</a:t>
+            </a:r>
+          </a:p>
+          <a:p>
+            <a:pPr marL="356870" marR="0" indent="-356870">
+              <a:lnSpc>
+                <a:spcPct val="107000"/>
+              </a:lnSpc>
+              <a:spcBef>
+                <a:spcPts val="0"/>
+              </a:spcBef>
+              <a:spcAft>
+                <a:spcPts val="800"/>
+              </a:spcAft>
+            </a:pPr>
+            <a:r>
+              <a:rPr lang="en-US" sz="1800" dirty="0">
+                <a:effectLst/>
+                <a:latin typeface="Times New Roman" panose="02020603050405020304" pitchFamily="18" charset="0"/>
+                <a:ea typeface="Times New Roman" panose="02020603050405020304" pitchFamily="18" charset="0"/>
+                <a:cs typeface="Times New Roman" panose="02020603050405020304" pitchFamily="18" charset="0"/>
+              </a:rPr>
+              <a:t>SQL - Create Tables. (n.d.). Retrieved January 03, 2021, from https://www.tutorialspoint.com/t_sql/t_sql_create_tables.htm</a:t>
+            </a:r>
+            <a:endParaRPr lang="en-US" sz="1800" dirty="0">
+              <a:effectLst/>
+              <a:latin typeface="Calibri" panose="020F0502020204030204" pitchFamily="34" charset="0"/>
+              <a:ea typeface="Calibri" panose="020F0502020204030204" pitchFamily="34" charset="0"/>
+              <a:cs typeface="Times New Roman" panose="02020603050405020304" pitchFamily="18" charset="0"/>
+            </a:endParaRPr>
+          </a:p>
+          <a:p>
+            <a:pPr marL="356870" marR="0" indent="-356870">
+              <a:lnSpc>
+                <a:spcPct val="107000"/>
+              </a:lnSpc>
+              <a:spcBef>
+                <a:spcPts val="0"/>
+              </a:spcBef>
+              <a:spcAft>
+                <a:spcPts val="800"/>
+              </a:spcAft>
+            </a:pPr>
+            <a:r>
+              <a:rPr lang="en-US" sz="1800" dirty="0">
+                <a:effectLst/>
+                <a:latin typeface="Times New Roman" panose="02020603050405020304" pitchFamily="18" charset="0"/>
+                <a:ea typeface="Times New Roman" panose="02020603050405020304" pitchFamily="18" charset="0"/>
+                <a:cs typeface="Times New Roman" panose="02020603050405020304" pitchFamily="18" charset="0"/>
+              </a:rPr>
+              <a:t>Stein, S., </a:t>
+            </a:r>
+            <a:r>
+              <a:rPr lang="en-US" sz="1800" dirty="0" err="1">
+                <a:effectLst/>
+                <a:latin typeface="Times New Roman" panose="02020603050405020304" pitchFamily="18" charset="0"/>
+                <a:ea typeface="Times New Roman" panose="02020603050405020304" pitchFamily="18" charset="0"/>
+                <a:cs typeface="Times New Roman" panose="02020603050405020304" pitchFamily="18" charset="0"/>
+              </a:rPr>
+              <a:t>Schonning</a:t>
+            </a:r>
+            <a:r>
+              <a:rPr lang="en-US" sz="1800" dirty="0">
+                <a:effectLst/>
+                <a:latin typeface="Times New Roman" panose="02020603050405020304" pitchFamily="18" charset="0"/>
+                <a:ea typeface="Times New Roman" panose="02020603050405020304" pitchFamily="18" charset="0"/>
+                <a:cs typeface="Times New Roman" panose="02020603050405020304" pitchFamily="18" charset="0"/>
+              </a:rPr>
+              <a:t>, N., Coulter, D., Sherer, T., &amp; Warren, G. (2017, March 30). Code examples - ADO.NET. Retrieved January 03, 2021, from https://docs.microsoft.com/en-us/dotnet/framework/data/adonet/ado-net-code-examples</a:t>
+            </a:r>
+            <a:endParaRPr lang="en-US" sz="1800" dirty="0">
+              <a:effectLst/>
+              <a:latin typeface="Calibri" panose="020F0502020204030204" pitchFamily="34" charset="0"/>
+              <a:ea typeface="Calibri" panose="020F0502020204030204" pitchFamily="34" charset="0"/>
+              <a:cs typeface="Times New Roman" panose="02020603050405020304" pitchFamily="18" charset="0"/>
+            </a:endParaRPr>
+          </a:p>
+          <a:p>
+            <a:pPr marL="360045" marR="0" indent="-360045"/>
+            <a:r>
+              <a:rPr lang="en-US" sz="1800" dirty="0">
+                <a:effectLst/>
+                <a:latin typeface="Times New Roman" panose="02020603050405020304" pitchFamily="18" charset="0"/>
+                <a:ea typeface="Times New Roman" panose="02020603050405020304" pitchFamily="18" charset="0"/>
+              </a:rPr>
+              <a:t>Zhelev, D. (2020, September 08). The Role of Layers in Web Applications. Retrieved January 01, 2021, from https://mentormate.com/blog/the-role-of-layers-in-web-applications/</a:t>
             </a:r>
           </a:p>
         </p:txBody>
@@ -5746,7 +7146,15 @@
           <a:p>
             <a:r>
               <a:rPr lang="en-US" dirty="0"/>
-              <a:t>This webpage consists of different content built upon a variety of languages and frameworks.</a:t>
+              <a:t>This webpage consists of an ASP .NET Framework and is MVC based. Web API’s, </a:t>
+            </a:r>
+            <a:r>
+              <a:rPr lang="en-US" dirty="0" err="1"/>
+              <a:t>IoC</a:t>
+            </a:r>
+            <a:r>
+              <a:rPr lang="en-US" dirty="0"/>
+              <a:t>, and Request filtering is also included</a:t>
             </a:r>
           </a:p>
           <a:p>
@@ -5755,7 +7163,7 @@
           <a:p>
             <a:r>
               <a:rPr lang="en-US" dirty="0"/>
-              <a:t>The basis of this program is to allow users to upload and share music content, including songs, videos, and album artwork via a centralized database.</a:t>
+              <a:t>The basis of this program is to allow users to play Minesweeper and save their game to return to it later.</a:t>
             </a:r>
           </a:p>
         </p:txBody>
@@ -5807,28 +7215,38 @@
           </a:p>
         </p:txBody>
       </p:sp>
-      <p:sp>
-        <p:nvSpPr>
-          <p:cNvPr id="3" name="Content Placeholder 2"/>
-          <p:cNvSpPr>
-            <a:spLocks noGrp="1"/>
-          </p:cNvSpPr>
+      <p:pic>
+        <p:nvPicPr>
+          <p:cNvPr id="4" name="Content Placeholder 3">
+            <a:extLst>
+              <a:ext uri="{FF2B5EF4-FFF2-40B4-BE49-F238E27FC236}">
+                <a16:creationId xmlns:a16="http://schemas.microsoft.com/office/drawing/2014/main" id="{4737791B-DF4F-4FBC-BEC6-AADFCD421E4F}"/>
+              </a:ext>
+            </a:extLst>
+          </p:cNvPr>
+          <p:cNvPicPr>
+            <a:picLocks noGrp="1" noChangeAspect="1"/>
+          </p:cNvPicPr>
           <p:nvPr>
             <p:ph idx="1"/>
           </p:nvPr>
-        </p:nvSpPr>
-        <p:spPr/>
-        <p:txBody>
-          <a:bodyPr/>
-          <a:lstStyle/>
-          <a:p>
-            <a:pPr marL="0" indent="0">
-              <a:buNone/>
-            </a:pPr>
-            <a:endParaRPr lang="en-US" dirty="0"/>
-          </a:p>
-        </p:txBody>
-      </p:sp>
+        </p:nvPicPr>
+        <p:blipFill>
+          <a:blip r:embed="rId3"/>
+          <a:stretch>
+            <a:fillRect/>
+          </a:stretch>
+        </p:blipFill>
+        <p:spPr>
+          <a:xfrm>
+            <a:off x="1857021" y="1609725"/>
+            <a:ext cx="4439357" cy="4846638"/>
+          </a:xfrm>
+          <a:prstGeom prst="rect">
+            <a:avLst/>
+          </a:prstGeom>
+        </p:spPr>
+      </p:pic>
     </p:spTree>
   </p:cSld>
   <p:clrMapOvr>
@@ -5856,7 +7274,13 @@
       </p:grpSpPr>
       <p:sp>
         <p:nvSpPr>
-          <p:cNvPr id="2" name="Title 1"/>
+          <p:cNvPr id="2" name="Title 1">
+            <a:extLst>
+              <a:ext uri="{FF2B5EF4-FFF2-40B4-BE49-F238E27FC236}">
+                <a16:creationId xmlns:a16="http://schemas.microsoft.com/office/drawing/2014/main" id="{0F975ADB-3D4D-4B97-9703-DF31E36C1C38}"/>
+              </a:ext>
+            </a:extLst>
+          </p:cNvPr>
           <p:cNvSpPr>
             <a:spLocks noGrp="1"/>
           </p:cNvSpPr>
@@ -5871,48 +7295,52 @@
           <a:p>
             <a:r>
               <a:rPr lang="en-US" dirty="0"/>
-              <a:t>UML </a:t>
-            </a:r>
-            <a:r>
-              <a:rPr lang="en-US" dirty="0" err="1"/>
-              <a:t>ClAss</a:t>
-            </a:r>
-            <a:r>
-              <a:rPr lang="en-US" dirty="0"/>
-              <a:t> Diagrams:</a:t>
-            </a:r>
-          </a:p>
-        </p:txBody>
-      </p:sp>
-      <p:sp>
-        <p:nvSpPr>
-          <p:cNvPr id="3" name="Content Placeholder 2"/>
-          <p:cNvSpPr>
-            <a:spLocks noGrp="1"/>
-          </p:cNvSpPr>
+              <a:t>Login Web-frame</a:t>
+            </a:r>
+          </a:p>
+        </p:txBody>
+      </p:sp>
+      <p:pic>
+        <p:nvPicPr>
+          <p:cNvPr id="7" name="Content Placeholder 6" descr="Graphical user interface, application, Teams&#10;&#10;Description automatically generated">
+            <a:extLst>
+              <a:ext uri="{FF2B5EF4-FFF2-40B4-BE49-F238E27FC236}">
+                <a16:creationId xmlns:a16="http://schemas.microsoft.com/office/drawing/2014/main" id="{4D35A78B-249E-4B70-B4EB-AA3BA50877AE}"/>
+              </a:ext>
+            </a:extLst>
+          </p:cNvPr>
+          <p:cNvPicPr>
+            <a:picLocks noGrp="1" noChangeAspect="1"/>
+          </p:cNvPicPr>
           <p:nvPr>
             <p:ph idx="1"/>
           </p:nvPr>
-        </p:nvSpPr>
-        <p:spPr/>
-        <p:txBody>
-          <a:bodyPr>
-            <a:normAutofit/>
-          </a:bodyPr>
-          <a:lstStyle/>
-          <a:p>
-            <a:pPr marL="292608" lvl="1" indent="0">
-              <a:buNone/>
-            </a:pPr>
-            <a:endParaRPr lang="en-US" dirty="0"/>
-          </a:p>
-          <a:p>
-            <a:pPr lvl="1"/>
-            <a:endParaRPr lang="en-US" dirty="0"/>
-          </a:p>
-        </p:txBody>
-      </p:sp>
+        </p:nvPicPr>
+        <p:blipFill>
+          <a:blip r:embed="rId2">
+            <a:extLst>
+              <a:ext uri="{28A0092B-C50C-407E-A947-70E740481C1C}">
+                <a14:useLocalDpi xmlns:a14="http://schemas.microsoft.com/office/drawing/2010/main" val="0"/>
+              </a:ext>
+            </a:extLst>
+          </a:blip>
+          <a:stretch>
+            <a:fillRect/>
+          </a:stretch>
+        </p:blipFill>
+        <p:spPr>
+          <a:xfrm>
+            <a:off x="862537" y="1609725"/>
+            <a:ext cx="6428325" cy="4846638"/>
+          </a:xfrm>
+        </p:spPr>
+      </p:pic>
     </p:spTree>
+    <p:extLst>
+      <p:ext uri="{BB962C8B-B14F-4D97-AF65-F5344CB8AC3E}">
+        <p14:creationId xmlns:p14="http://schemas.microsoft.com/office/powerpoint/2010/main" val="3238444297"/>
+      </p:ext>
+    </p:extLst>
   </p:cSld>
   <p:clrMapOvr>
     <a:masterClrMapping/>
@@ -5939,7 +7367,13 @@
       </p:grpSpPr>
       <p:sp>
         <p:nvSpPr>
-          <p:cNvPr id="2" name="Title 1"/>
+          <p:cNvPr id="2" name="Title 1">
+            <a:extLst>
+              <a:ext uri="{FF2B5EF4-FFF2-40B4-BE49-F238E27FC236}">
+                <a16:creationId xmlns:a16="http://schemas.microsoft.com/office/drawing/2014/main" id="{1767D165-6FC1-4E8B-9553-BE79D1415138}"/>
+              </a:ext>
+            </a:extLst>
+          </p:cNvPr>
           <p:cNvSpPr>
             <a:spLocks noGrp="1"/>
           </p:cNvSpPr>
@@ -5954,51 +7388,50 @@
           <a:p>
             <a:r>
               <a:rPr lang="en-US" dirty="0"/>
-              <a:t>UML </a:t>
-            </a:r>
-            <a:r>
-              <a:rPr lang="en-US" dirty="0" err="1"/>
-              <a:t>ClAss</a:t>
-            </a:r>
-            <a:r>
-              <a:rPr lang="en-US" dirty="0"/>
-              <a:t> Diagrams:</a:t>
-            </a:r>
-          </a:p>
-        </p:txBody>
-      </p:sp>
-      <p:sp>
-        <p:nvSpPr>
-          <p:cNvPr id="3" name="Content Placeholder 2"/>
-          <p:cNvSpPr>
-            <a:spLocks noGrp="1"/>
-          </p:cNvSpPr>
+              <a:t>Registration Web-Frame</a:t>
+            </a:r>
+          </a:p>
+        </p:txBody>
+      </p:sp>
+      <p:pic>
+        <p:nvPicPr>
+          <p:cNvPr id="5" name="Content Placeholder 4" descr="Graphical user interface, application, Teams&#10;&#10;Description automatically generated">
+            <a:extLst>
+              <a:ext uri="{FF2B5EF4-FFF2-40B4-BE49-F238E27FC236}">
+                <a16:creationId xmlns:a16="http://schemas.microsoft.com/office/drawing/2014/main" id="{027A14C1-0A71-4E08-B760-C0C3F81F7779}"/>
+              </a:ext>
+            </a:extLst>
+          </p:cNvPr>
+          <p:cNvPicPr>
+            <a:picLocks noGrp="1" noChangeAspect="1"/>
+          </p:cNvPicPr>
           <p:nvPr>
             <p:ph idx="1"/>
           </p:nvPr>
-        </p:nvSpPr>
-        <p:spPr/>
-        <p:txBody>
-          <a:bodyPr>
-            <a:normAutofit/>
-          </a:bodyPr>
-          <a:lstStyle/>
-          <a:p>
-            <a:pPr marL="292608" lvl="1" indent="0">
-              <a:buNone/>
-            </a:pPr>
-            <a:endParaRPr lang="en-US" dirty="0"/>
-          </a:p>
-          <a:p>
-            <a:pPr lvl="1"/>
-            <a:endParaRPr lang="en-US" dirty="0"/>
-          </a:p>
-        </p:txBody>
-      </p:sp>
+        </p:nvPicPr>
+        <p:blipFill>
+          <a:blip r:embed="rId2">
+            <a:extLst>
+              <a:ext uri="{28A0092B-C50C-407E-A947-70E740481C1C}">
+                <a14:useLocalDpi xmlns:a14="http://schemas.microsoft.com/office/drawing/2010/main" val="0"/>
+              </a:ext>
+            </a:extLst>
+          </a:blip>
+          <a:stretch>
+            <a:fillRect/>
+          </a:stretch>
+        </p:blipFill>
+        <p:spPr>
+          <a:xfrm>
+            <a:off x="864321" y="1609725"/>
+            <a:ext cx="6424757" cy="4846638"/>
+          </a:xfrm>
+        </p:spPr>
+      </p:pic>
     </p:spTree>
     <p:extLst>
       <p:ext uri="{BB962C8B-B14F-4D97-AF65-F5344CB8AC3E}">
-        <p14:creationId xmlns:p14="http://schemas.microsoft.com/office/powerpoint/2010/main" val="2149231307"/>
+        <p14:creationId xmlns:p14="http://schemas.microsoft.com/office/powerpoint/2010/main" val="2286409506"/>
       </p:ext>
     </p:extLst>
   </p:cSld>
@@ -6035,6 +7468,241 @@
             <p:ph type="title"/>
           </p:nvPr>
         </p:nvSpPr>
+        <p:spPr/>
+        <p:txBody>
+          <a:bodyPr/>
+          <a:lstStyle/>
+          <a:p>
+            <a:r>
+              <a:rPr lang="en-US" dirty="0"/>
+              <a:t>UML User </a:t>
+            </a:r>
+            <a:r>
+              <a:rPr lang="en-US" dirty="0" err="1"/>
+              <a:t>ClAss</a:t>
+            </a:r>
+            <a:r>
+              <a:rPr lang="en-US" dirty="0"/>
+              <a:t> Diagram:</a:t>
+            </a:r>
+          </a:p>
+        </p:txBody>
+      </p:sp>
+      <p:sp>
+        <p:nvSpPr>
+          <p:cNvPr id="3" name="Content Placeholder 2"/>
+          <p:cNvSpPr>
+            <a:spLocks noGrp="1"/>
+          </p:cNvSpPr>
+          <p:nvPr>
+            <p:ph idx="1"/>
+          </p:nvPr>
+        </p:nvSpPr>
+        <p:spPr/>
+        <p:txBody>
+          <a:bodyPr>
+            <a:normAutofit/>
+          </a:bodyPr>
+          <a:lstStyle/>
+          <a:p>
+            <a:pPr marL="292608" lvl="1" indent="0">
+              <a:buNone/>
+            </a:pPr>
+            <a:endParaRPr lang="en-US" dirty="0"/>
+          </a:p>
+          <a:p>
+            <a:pPr lvl="1"/>
+            <a:endParaRPr lang="en-US" dirty="0"/>
+          </a:p>
+        </p:txBody>
+      </p:sp>
+      <p:pic>
+        <p:nvPicPr>
+          <p:cNvPr id="5" name="Picture 4" descr="Table&#10;&#10;Description automatically generated with medium confidence">
+            <a:extLst>
+              <a:ext uri="{FF2B5EF4-FFF2-40B4-BE49-F238E27FC236}">
+                <a16:creationId xmlns:a16="http://schemas.microsoft.com/office/drawing/2014/main" id="{5399B5DD-CAA6-45F2-A2C1-95AD31670F35}"/>
+              </a:ext>
+            </a:extLst>
+          </p:cNvPr>
+          <p:cNvPicPr>
+            <a:picLocks noChangeAspect="1"/>
+          </p:cNvPicPr>
+          <p:nvPr/>
+        </p:nvPicPr>
+        <p:blipFill>
+          <a:blip r:embed="rId3">
+            <a:extLst>
+              <a:ext uri="{28A0092B-C50C-407E-A947-70E740481C1C}">
+                <a14:useLocalDpi xmlns:a14="http://schemas.microsoft.com/office/drawing/2010/main" val="0"/>
+              </a:ext>
+            </a:extLst>
+          </a:blip>
+          <a:stretch>
+            <a:fillRect/>
+          </a:stretch>
+        </p:blipFill>
+        <p:spPr>
+          <a:xfrm>
+            <a:off x="3347866" y="1814287"/>
+            <a:ext cx="2448267" cy="3229426"/>
+          </a:xfrm>
+          <a:prstGeom prst="rect">
+            <a:avLst/>
+          </a:prstGeom>
+        </p:spPr>
+      </p:pic>
+    </p:spTree>
+  </p:cSld>
+  <p:clrMapOvr>
+    <a:masterClrMapping/>
+  </p:clrMapOvr>
+</p:sld>
+</file>
+
+<file path=ppt/slides/slide7.xml><?xml version="1.0" encoding="utf-8"?>
+<p:sld xmlns:a="http://schemas.openxmlformats.org/drawingml/2006/main" xmlns:r="http://schemas.openxmlformats.org/officeDocument/2006/relationships" xmlns:p="http://schemas.openxmlformats.org/presentationml/2006/main">
+  <p:cSld>
+    <p:spTree>
+      <p:nvGrpSpPr>
+        <p:cNvPr id="1" name=""/>
+        <p:cNvGrpSpPr/>
+        <p:nvPr/>
+      </p:nvGrpSpPr>
+      <p:grpSpPr>
+        <a:xfrm>
+          <a:off x="0" y="0"/>
+          <a:ext cx="0" cy="0"/>
+          <a:chOff x="0" y="0"/>
+          <a:chExt cx="0" cy="0"/>
+        </a:xfrm>
+      </p:grpSpPr>
+      <p:sp>
+        <p:nvSpPr>
+          <p:cNvPr id="2" name="Title 1"/>
+          <p:cNvSpPr>
+            <a:spLocks noGrp="1"/>
+          </p:cNvSpPr>
+          <p:nvPr>
+            <p:ph type="title"/>
+          </p:nvPr>
+        </p:nvSpPr>
+        <p:spPr/>
+        <p:txBody>
+          <a:bodyPr/>
+          <a:lstStyle/>
+          <a:p>
+            <a:r>
+              <a:rPr lang="en-US" dirty="0"/>
+              <a:t>User Table ER Diagram:</a:t>
+            </a:r>
+          </a:p>
+        </p:txBody>
+      </p:sp>
+      <p:sp>
+        <p:nvSpPr>
+          <p:cNvPr id="3" name="Content Placeholder 2"/>
+          <p:cNvSpPr>
+            <a:spLocks noGrp="1"/>
+          </p:cNvSpPr>
+          <p:nvPr>
+            <p:ph idx="1"/>
+          </p:nvPr>
+        </p:nvSpPr>
+        <p:spPr/>
+        <p:txBody>
+          <a:bodyPr>
+            <a:normAutofit/>
+          </a:bodyPr>
+          <a:lstStyle/>
+          <a:p>
+            <a:pPr marL="292608" lvl="1" indent="0">
+              <a:buNone/>
+            </a:pPr>
+            <a:endParaRPr lang="en-US" dirty="0"/>
+          </a:p>
+          <a:p>
+            <a:pPr lvl="1"/>
+            <a:endParaRPr lang="en-US" dirty="0"/>
+          </a:p>
+        </p:txBody>
+      </p:sp>
+      <p:pic>
+        <p:nvPicPr>
+          <p:cNvPr id="5" name="Picture 4" descr="Graphical user interface, table&#10;&#10;Description automatically generated">
+            <a:extLst>
+              <a:ext uri="{FF2B5EF4-FFF2-40B4-BE49-F238E27FC236}">
+                <a16:creationId xmlns:a16="http://schemas.microsoft.com/office/drawing/2014/main" id="{C7CD76C7-1353-47A5-9232-4897A0F3FDDF}"/>
+              </a:ext>
+            </a:extLst>
+          </p:cNvPr>
+          <p:cNvPicPr>
+            <a:picLocks noChangeAspect="1"/>
+          </p:cNvPicPr>
+          <p:nvPr/>
+        </p:nvPicPr>
+        <p:blipFill>
+          <a:blip r:embed="rId3">
+            <a:extLst>
+              <a:ext uri="{28A0092B-C50C-407E-A947-70E740481C1C}">
+                <a14:useLocalDpi xmlns:a14="http://schemas.microsoft.com/office/drawing/2010/main" val="0"/>
+              </a:ext>
+            </a:extLst>
+          </a:blip>
+          <a:stretch>
+            <a:fillRect/>
+          </a:stretch>
+        </p:blipFill>
+        <p:spPr>
+          <a:xfrm>
+            <a:off x="3328987" y="2076450"/>
+            <a:ext cx="2486025" cy="2705100"/>
+          </a:xfrm>
+          <a:prstGeom prst="rect">
+            <a:avLst/>
+          </a:prstGeom>
+        </p:spPr>
+      </p:pic>
+    </p:spTree>
+    <p:extLst>
+      <p:ext uri="{BB962C8B-B14F-4D97-AF65-F5344CB8AC3E}">
+        <p14:creationId xmlns:p14="http://schemas.microsoft.com/office/powerpoint/2010/main" val="2149231307"/>
+      </p:ext>
+    </p:extLst>
+  </p:cSld>
+  <p:clrMapOvr>
+    <a:masterClrMapping/>
+  </p:clrMapOvr>
+</p:sld>
+</file>
+
+<file path=ppt/slides/slide8.xml><?xml version="1.0" encoding="utf-8"?>
+<p:sld xmlns:a="http://schemas.openxmlformats.org/drawingml/2006/main" xmlns:r="http://schemas.openxmlformats.org/officeDocument/2006/relationships" xmlns:p="http://schemas.openxmlformats.org/presentationml/2006/main">
+  <p:cSld>
+    <p:spTree>
+      <p:nvGrpSpPr>
+        <p:cNvPr id="1" name=""/>
+        <p:cNvGrpSpPr/>
+        <p:nvPr/>
+      </p:nvGrpSpPr>
+      <p:grpSpPr>
+        <a:xfrm>
+          <a:off x="0" y="0"/>
+          <a:ext cx="0" cy="0"/>
+          <a:chOff x="0" y="0"/>
+          <a:chExt cx="0" cy="0"/>
+        </a:xfrm>
+      </p:grpSpPr>
+      <p:sp>
+        <p:nvSpPr>
+          <p:cNvPr id="2" name="Title 1"/>
+          <p:cNvSpPr>
+            <a:spLocks noGrp="1"/>
+          </p:cNvSpPr>
+          <p:nvPr>
+            <p:ph type="title"/>
+          </p:nvPr>
+        </p:nvSpPr>
         <p:spPr>
           <a:xfrm>
             <a:off x="457200" y="320040"/>
@@ -6049,7 +7717,14 @@
           <a:p>
             <a:r>
               <a:rPr lang="en-US" dirty="0"/>
-              <a:t>Video demonstration by: Stephan Moncavage</a:t>
+              <a:t>Video demonstration by: </a:t>
+            </a:r>
+            <a:br>
+              <a:rPr lang="en-US" dirty="0"/>
+            </a:br>
+            <a:r>
+              <a:rPr lang="en-US" dirty="0"/>
+              <a:t>Tim James</a:t>
             </a:r>
           </a:p>
         </p:txBody>
@@ -6263,7 +7938,7 @@
 </p:sld>
 </file>
 
-<file path=ppt/slides/slide7.xml><?xml version="1.0" encoding="utf-8"?>
+<file path=ppt/slides/slide9.xml><?xml version="1.0" encoding="utf-8"?>
 <p:sld xmlns:a="http://schemas.openxmlformats.org/drawingml/2006/main" xmlns:r="http://schemas.openxmlformats.org/officeDocument/2006/relationships" xmlns:p="http://schemas.openxmlformats.org/presentationml/2006/main">
   <p:cSld>
     <p:spTree>
@@ -6997,1059 +8672,6 @@
 </p:sld>
 </file>
 
-<file path=ppt/slides/slide8.xml><?xml version="1.0" encoding="utf-8"?>
-<p:sld xmlns:a="http://schemas.openxmlformats.org/drawingml/2006/main" xmlns:r="http://schemas.openxmlformats.org/officeDocument/2006/relationships" xmlns:p="http://schemas.openxmlformats.org/presentationml/2006/main">
-  <p:cSld>
-    <p:spTree>
-      <p:nvGrpSpPr>
-        <p:cNvPr id="1" name=""/>
-        <p:cNvGrpSpPr/>
-        <p:nvPr/>
-      </p:nvGrpSpPr>
-      <p:grpSpPr>
-        <a:xfrm>
-          <a:off x="0" y="0"/>
-          <a:ext cx="0" cy="0"/>
-          <a:chOff x="0" y="0"/>
-          <a:chExt cx="0" cy="0"/>
-        </a:xfrm>
-      </p:grpSpPr>
-      <p:sp>
-        <p:nvSpPr>
-          <p:cNvPr id="2" name="Title 1"/>
-          <p:cNvSpPr>
-            <a:spLocks noGrp="1"/>
-          </p:cNvSpPr>
-          <p:nvPr>
-            <p:ph type="title"/>
-          </p:nvPr>
-        </p:nvSpPr>
-        <p:spPr>
-          <a:xfrm>
-            <a:off x="457200" y="320040"/>
-            <a:ext cx="7239000" cy="518160"/>
-          </a:xfrm>
-        </p:spPr>
-        <p:txBody>
-          <a:bodyPr>
-            <a:normAutofit fontScale="90000"/>
-          </a:bodyPr>
-          <a:lstStyle/>
-          <a:p>
-            <a:r>
-              <a:rPr lang="en-US" dirty="0"/>
-              <a:t>Risks Continued</a:t>
-            </a:r>
-          </a:p>
-        </p:txBody>
-      </p:sp>
-      <p:graphicFrame>
-        <p:nvGraphicFramePr>
-          <p:cNvPr id="5" name="Content Placeholder 4">
-            <a:extLst>
-              <a:ext uri="{FF2B5EF4-FFF2-40B4-BE49-F238E27FC236}">
-                <a16:creationId xmlns:a16="http://schemas.microsoft.com/office/drawing/2014/main" id="{D90AF8D3-9E2C-44FD-8BAD-7B7982F9C08E}"/>
-              </a:ext>
-            </a:extLst>
-          </p:cNvPr>
-          <p:cNvGraphicFramePr>
-            <a:graphicFrameLocks noGrp="1"/>
-          </p:cNvGraphicFramePr>
-          <p:nvPr>
-            <p:ph idx="1"/>
-            <p:extLst>
-              <p:ext uri="{D42A27DB-BD31-4B8C-83A1-F6EECF244321}">
-                <p14:modId xmlns:p14="http://schemas.microsoft.com/office/powerpoint/2010/main" val="2560146335"/>
-              </p:ext>
-            </p:extLst>
-          </p:nvPr>
-        </p:nvGraphicFramePr>
-        <p:xfrm>
-          <a:off x="457200" y="1066800"/>
-          <a:ext cx="7239000" cy="5476081"/>
-        </p:xfrm>
-        <a:graphic>
-          <a:graphicData uri="http://schemas.openxmlformats.org/drawingml/2006/table">
-            <a:tbl>
-              <a:tblPr bandRow="1">
-                <a:tableStyleId>{5C22544A-7EE6-4342-B048-85BDC9FD1C3A}</a:tableStyleId>
-              </a:tblPr>
-              <a:tblGrid>
-                <a:gridCol w="1809498">
-                  <a:extLst>
-                    <a:ext uri="{9D8B030D-6E8A-4147-A177-3AD203B41FA5}">
-                      <a16:colId xmlns:a16="http://schemas.microsoft.com/office/drawing/2014/main" val="2592429754"/>
-                    </a:ext>
-                  </a:extLst>
-                </a:gridCol>
-                <a:gridCol w="1809498">
-                  <a:extLst>
-                    <a:ext uri="{9D8B030D-6E8A-4147-A177-3AD203B41FA5}">
-                      <a16:colId xmlns:a16="http://schemas.microsoft.com/office/drawing/2014/main" val="3809378308"/>
-                    </a:ext>
-                  </a:extLst>
-                </a:gridCol>
-                <a:gridCol w="1810002">
-                  <a:extLst>
-                    <a:ext uri="{9D8B030D-6E8A-4147-A177-3AD203B41FA5}">
-                      <a16:colId xmlns:a16="http://schemas.microsoft.com/office/drawing/2014/main" val="3618545182"/>
-                    </a:ext>
-                  </a:extLst>
-                </a:gridCol>
-                <a:gridCol w="1810002">
-                  <a:extLst>
-                    <a:ext uri="{9D8B030D-6E8A-4147-A177-3AD203B41FA5}">
-                      <a16:colId xmlns:a16="http://schemas.microsoft.com/office/drawing/2014/main" val="152360603"/>
-                    </a:ext>
-                  </a:extLst>
-                </a:gridCol>
-              </a:tblGrid>
-              <a:tr h="2093796">
-                <a:tc>
-                  <a:txBody>
-                    <a:bodyPr/>
-                    <a:lstStyle/>
-                    <a:p>
-                      <a:pPr marL="0" marR="0">
-                        <a:spcBef>
-                          <a:spcPts val="0"/>
-                        </a:spcBef>
-                        <a:spcAft>
-                          <a:spcPts val="0"/>
-                        </a:spcAft>
-                      </a:pPr>
-                      <a:r>
-                        <a:rPr lang="en-US" sz="1000">
-                          <a:effectLst/>
-                        </a:rPr>
-                        <a:t>Internet/Git</a:t>
-                      </a:r>
-                      <a:endParaRPr lang="en-US" sz="1000">
-                        <a:effectLst/>
-                        <a:latin typeface="Calibri" panose="020F0502020204030204" pitchFamily="34" charset="0"/>
-                        <a:ea typeface="Calibri" panose="020F0502020204030204" pitchFamily="34" charset="0"/>
-                        <a:cs typeface="Times New Roman" panose="02020603050405020304" pitchFamily="18" charset="0"/>
-                      </a:endParaRPr>
-                    </a:p>
-                  </a:txBody>
-                  <a:tcPr marL="54349" marR="54349" marT="0" marB="0"/>
-                </a:tc>
-                <a:tc>
-                  <a:txBody>
-                    <a:bodyPr/>
-                    <a:lstStyle/>
-                    <a:p>
-                      <a:pPr marL="0" marR="0">
-                        <a:spcBef>
-                          <a:spcPts val="0"/>
-                        </a:spcBef>
-                        <a:spcAft>
-                          <a:spcPts val="0"/>
-                        </a:spcAft>
-                      </a:pPr>
-                      <a:r>
-                        <a:rPr lang="en-US" sz="1000">
-                          <a:effectLst/>
-                        </a:rPr>
-                        <a:t>The internet could possibly go out for one of us, and that is detrimental to pushing code to GIT. Also, if GIT were to go down, we would not be able to share or access our working trees. </a:t>
-                      </a:r>
-                      <a:endParaRPr lang="en-US" sz="1000">
-                        <a:effectLst/>
-                        <a:latin typeface="Calibri" panose="020F0502020204030204" pitchFamily="34" charset="0"/>
-                        <a:ea typeface="Calibri" panose="020F0502020204030204" pitchFamily="34" charset="0"/>
-                        <a:cs typeface="Times New Roman" panose="02020603050405020304" pitchFamily="18" charset="0"/>
-                      </a:endParaRPr>
-                    </a:p>
-                  </a:txBody>
-                  <a:tcPr marL="54349" marR="54349" marT="0" marB="0"/>
-                </a:tc>
-                <a:tc>
-                  <a:txBody>
-                    <a:bodyPr/>
-                    <a:lstStyle/>
-                    <a:p>
-                      <a:pPr marL="0" marR="0">
-                        <a:spcBef>
-                          <a:spcPts val="0"/>
-                        </a:spcBef>
-                        <a:spcAft>
-                          <a:spcPts val="0"/>
-                        </a:spcAft>
-                      </a:pPr>
-                      <a:r>
-                        <a:rPr lang="en-US" sz="1000">
-                          <a:effectLst/>
-                        </a:rPr>
-                        <a:t>Make sure the internet is functional at your home, if it is not having a place you can go to that has internet for you to use. Pay bills ahead of time if necessary.</a:t>
-                      </a:r>
-                      <a:endParaRPr lang="en-US" sz="1000">
-                        <a:effectLst/>
-                        <a:latin typeface="Calibri" panose="020F0502020204030204" pitchFamily="34" charset="0"/>
-                        <a:ea typeface="Calibri" panose="020F0502020204030204" pitchFamily="34" charset="0"/>
-                        <a:cs typeface="Times New Roman" panose="02020603050405020304" pitchFamily="18" charset="0"/>
-                      </a:endParaRPr>
-                    </a:p>
-                  </a:txBody>
-                  <a:tcPr marL="54349" marR="54349" marT="0" marB="0"/>
-                </a:tc>
-                <a:tc>
-                  <a:txBody>
-                    <a:bodyPr/>
-                    <a:lstStyle/>
-                    <a:p>
-                      <a:pPr marL="0" marR="0">
-                        <a:spcBef>
-                          <a:spcPts val="0"/>
-                        </a:spcBef>
-                        <a:spcAft>
-                          <a:spcPts val="0"/>
-                        </a:spcAft>
-                      </a:pPr>
-                      <a:r>
-                        <a:rPr lang="en-US" sz="1000">
-                          <a:effectLst/>
-                        </a:rPr>
-                        <a:t>Keeping the bills paid early from month to month is a simple start. Make sure you pay attention to possible outages and have a backup place to go if yours does go down. Find a coffee shop that has free Wi-Fi, or a friend’s home that they will allow you to use. Watch to see if GIT notifies on outages or possible updates and changes.</a:t>
-                      </a:r>
-                      <a:endParaRPr lang="en-US" sz="1000">
-                        <a:effectLst/>
-                        <a:latin typeface="Calibri" panose="020F0502020204030204" pitchFamily="34" charset="0"/>
-                        <a:ea typeface="Calibri" panose="020F0502020204030204" pitchFamily="34" charset="0"/>
-                        <a:cs typeface="Times New Roman" panose="02020603050405020304" pitchFamily="18" charset="0"/>
-                      </a:endParaRPr>
-                    </a:p>
-                  </a:txBody>
-                  <a:tcPr marL="54349" marR="54349" marT="0" marB="0"/>
-                </a:tc>
-                <a:extLst>
-                  <a:ext uri="{0D108BD9-81ED-4DB2-BD59-A6C34878D82A}">
-                    <a16:rowId xmlns:a16="http://schemas.microsoft.com/office/drawing/2014/main" val="2860719083"/>
-                  </a:ext>
-                </a:extLst>
-              </a:tr>
-              <a:tr h="1610612">
-                <a:tc>
-                  <a:txBody>
-                    <a:bodyPr/>
-                    <a:lstStyle/>
-                    <a:p>
-                      <a:pPr marL="0" marR="0">
-                        <a:spcBef>
-                          <a:spcPts val="0"/>
-                        </a:spcBef>
-                        <a:spcAft>
-                          <a:spcPts val="0"/>
-                        </a:spcAft>
-                      </a:pPr>
-                      <a:r>
-                        <a:rPr lang="en-US" sz="1000">
-                          <a:effectLst/>
-                        </a:rPr>
-                        <a:t>Individual’s not fulfilling sprint tasks</a:t>
-                      </a:r>
-                      <a:endParaRPr lang="en-US" sz="1000">
-                        <a:effectLst/>
-                        <a:latin typeface="Calibri" panose="020F0502020204030204" pitchFamily="34" charset="0"/>
-                        <a:ea typeface="Calibri" panose="020F0502020204030204" pitchFamily="34" charset="0"/>
-                        <a:cs typeface="Times New Roman" panose="02020603050405020304" pitchFamily="18" charset="0"/>
-                      </a:endParaRPr>
-                    </a:p>
-                  </a:txBody>
-                  <a:tcPr marL="54349" marR="54349" marT="0" marB="0"/>
-                </a:tc>
-                <a:tc>
-                  <a:txBody>
-                    <a:bodyPr/>
-                    <a:lstStyle/>
-                    <a:p>
-                      <a:pPr marL="0" marR="0">
-                        <a:spcBef>
-                          <a:spcPts val="0"/>
-                        </a:spcBef>
-                        <a:spcAft>
-                          <a:spcPts val="0"/>
-                        </a:spcAft>
-                      </a:pPr>
-                      <a:r>
-                        <a:rPr lang="en-US" sz="1000">
-                          <a:effectLst/>
-                        </a:rPr>
-                        <a:t>Any one of the issues listed could work against us, but not being involved in the development process and getting the individually assigned work done hurts the team. </a:t>
-                      </a:r>
-                      <a:endParaRPr lang="en-US" sz="1000">
-                        <a:effectLst/>
-                        <a:latin typeface="Calibri" panose="020F0502020204030204" pitchFamily="34" charset="0"/>
-                        <a:ea typeface="Calibri" panose="020F0502020204030204" pitchFamily="34" charset="0"/>
-                        <a:cs typeface="Times New Roman" panose="02020603050405020304" pitchFamily="18" charset="0"/>
-                      </a:endParaRPr>
-                    </a:p>
-                  </a:txBody>
-                  <a:tcPr marL="54349" marR="54349" marT="0" marB="0"/>
-                </a:tc>
-                <a:tc>
-                  <a:txBody>
-                    <a:bodyPr/>
-                    <a:lstStyle/>
-                    <a:p>
-                      <a:pPr marL="0" marR="0">
-                        <a:spcBef>
-                          <a:spcPts val="0"/>
-                        </a:spcBef>
-                        <a:spcAft>
-                          <a:spcPts val="0"/>
-                        </a:spcAft>
-                      </a:pPr>
-                      <a:r>
-                        <a:rPr lang="en-US" sz="1000">
-                          <a:effectLst/>
-                        </a:rPr>
-                        <a:t>Keeping each other accountable for the work needed to be done. Making sure we mark off tasks and stay in communication.</a:t>
-                      </a:r>
-                      <a:endParaRPr lang="en-US" sz="1000">
-                        <a:effectLst/>
-                        <a:latin typeface="Calibri" panose="020F0502020204030204" pitchFamily="34" charset="0"/>
-                        <a:ea typeface="Calibri" panose="020F0502020204030204" pitchFamily="34" charset="0"/>
-                        <a:cs typeface="Times New Roman" panose="02020603050405020304" pitchFamily="18" charset="0"/>
-                      </a:endParaRPr>
-                    </a:p>
-                  </a:txBody>
-                  <a:tcPr marL="54349" marR="54349" marT="0" marB="0"/>
-                </a:tc>
-                <a:tc>
-                  <a:txBody>
-                    <a:bodyPr/>
-                    <a:lstStyle/>
-                    <a:p>
-                      <a:pPr marL="0" marR="0">
-                        <a:spcBef>
-                          <a:spcPts val="0"/>
-                        </a:spcBef>
-                        <a:spcAft>
-                          <a:spcPts val="0"/>
-                        </a:spcAft>
-                      </a:pPr>
-                      <a:r>
-                        <a:rPr lang="en-US" sz="1000">
-                          <a:effectLst/>
-                        </a:rPr>
-                        <a:t>Stay on task, this is not about an individual grade, we are in this together. If you are going to need some slack for the week let the team know and we can work something out. It may even be possible to get extensions if we can let the instructor know about something going on. </a:t>
-                      </a:r>
-                      <a:endParaRPr lang="en-US" sz="1000">
-                        <a:effectLst/>
-                        <a:latin typeface="Calibri" panose="020F0502020204030204" pitchFamily="34" charset="0"/>
-                        <a:ea typeface="Calibri" panose="020F0502020204030204" pitchFamily="34" charset="0"/>
-                        <a:cs typeface="Times New Roman" panose="02020603050405020304" pitchFamily="18" charset="0"/>
-                      </a:endParaRPr>
-                    </a:p>
-                  </a:txBody>
-                  <a:tcPr marL="54349" marR="54349" marT="0" marB="0"/>
-                </a:tc>
-                <a:extLst>
-                  <a:ext uri="{0D108BD9-81ED-4DB2-BD59-A6C34878D82A}">
-                    <a16:rowId xmlns:a16="http://schemas.microsoft.com/office/drawing/2014/main" val="2440786370"/>
-                  </a:ext>
-                </a:extLst>
-              </a:tr>
-              <a:tr h="1771673">
-                <a:tc>
-                  <a:txBody>
-                    <a:bodyPr/>
-                    <a:lstStyle/>
-                    <a:p>
-                      <a:pPr marL="0" marR="0">
-                        <a:spcBef>
-                          <a:spcPts val="0"/>
-                        </a:spcBef>
-                        <a:spcAft>
-                          <a:spcPts val="0"/>
-                        </a:spcAft>
-                      </a:pPr>
-                      <a:r>
-                        <a:rPr lang="en-US" sz="1000">
-                          <a:effectLst/>
-                        </a:rPr>
-                        <a:t>New skills needed to complete tasks</a:t>
-                      </a:r>
-                      <a:endParaRPr lang="en-US" sz="1000">
-                        <a:effectLst/>
-                        <a:latin typeface="Calibri" panose="020F0502020204030204" pitchFamily="34" charset="0"/>
-                        <a:ea typeface="Calibri" panose="020F0502020204030204" pitchFamily="34" charset="0"/>
-                        <a:cs typeface="Times New Roman" panose="02020603050405020304" pitchFamily="18" charset="0"/>
-                      </a:endParaRPr>
-                    </a:p>
-                  </a:txBody>
-                  <a:tcPr marL="54349" marR="54349" marT="0" marB="0"/>
-                </a:tc>
-                <a:tc>
-                  <a:txBody>
-                    <a:bodyPr/>
-                    <a:lstStyle/>
-                    <a:p>
-                      <a:pPr marL="0" marR="0">
-                        <a:spcBef>
-                          <a:spcPts val="0"/>
-                        </a:spcBef>
-                        <a:spcAft>
-                          <a:spcPts val="0"/>
-                        </a:spcAft>
-                      </a:pPr>
-                      <a:r>
-                        <a:rPr lang="en-US" sz="1000">
-                          <a:effectLst/>
-                        </a:rPr>
-                        <a:t>Since we are all in school, it is assumed we all have something to learn. Be it the environment, language or process. There is a learning curve attached to them all and everyone has to be diligent in trying to learn in a timely manner. </a:t>
-                      </a:r>
-                      <a:endParaRPr lang="en-US" sz="1000">
-                        <a:effectLst/>
-                        <a:latin typeface="Calibri" panose="020F0502020204030204" pitchFamily="34" charset="0"/>
-                        <a:ea typeface="Calibri" panose="020F0502020204030204" pitchFamily="34" charset="0"/>
-                        <a:cs typeface="Times New Roman" panose="02020603050405020304" pitchFamily="18" charset="0"/>
-                      </a:endParaRPr>
-                    </a:p>
-                  </a:txBody>
-                  <a:tcPr marL="54349" marR="54349" marT="0" marB="0"/>
-                </a:tc>
-                <a:tc>
-                  <a:txBody>
-                    <a:bodyPr/>
-                    <a:lstStyle/>
-                    <a:p>
-                      <a:pPr marL="0" marR="0">
-                        <a:spcBef>
-                          <a:spcPts val="0"/>
-                        </a:spcBef>
-                        <a:spcAft>
-                          <a:spcPts val="0"/>
-                        </a:spcAft>
-                      </a:pPr>
-                      <a:r>
-                        <a:rPr lang="en-US" sz="1000">
-                          <a:effectLst/>
-                        </a:rPr>
-                        <a:t>If there is something, we need to learn in order to get the tasks for the week done, let the team know as soon as possible.</a:t>
-                      </a:r>
-                      <a:endParaRPr lang="en-US" sz="1000">
-                        <a:effectLst/>
-                        <a:latin typeface="Calibri" panose="020F0502020204030204" pitchFamily="34" charset="0"/>
-                        <a:ea typeface="Calibri" panose="020F0502020204030204" pitchFamily="34" charset="0"/>
-                        <a:cs typeface="Times New Roman" panose="02020603050405020304" pitchFamily="18" charset="0"/>
-                      </a:endParaRPr>
-                    </a:p>
-                  </a:txBody>
-                  <a:tcPr marL="54349" marR="54349" marT="0" marB="0"/>
-                </a:tc>
-                <a:tc>
-                  <a:txBody>
-                    <a:bodyPr/>
-                    <a:lstStyle/>
-                    <a:p>
-                      <a:pPr marL="0" marR="0">
-                        <a:spcBef>
-                          <a:spcPts val="0"/>
-                        </a:spcBef>
-                        <a:spcAft>
-                          <a:spcPts val="0"/>
-                        </a:spcAft>
-                      </a:pPr>
-                      <a:r>
-                        <a:rPr lang="en-US" sz="1000" dirty="0">
-                          <a:effectLst/>
-                        </a:rPr>
-                        <a:t>Look at your tasks during the weekend prior to the start of the sprint, knowing what you have to work on early can let you know if you need to study and read prior to starting the sprint or before planning. Asks about potential resources and keep known ones favorite in your browser. </a:t>
-                      </a:r>
-                      <a:endParaRPr lang="en-US" sz="1000" dirty="0">
-                        <a:effectLst/>
-                        <a:latin typeface="Calibri" panose="020F0502020204030204" pitchFamily="34" charset="0"/>
-                        <a:ea typeface="Calibri" panose="020F0502020204030204" pitchFamily="34" charset="0"/>
-                        <a:cs typeface="Times New Roman" panose="02020603050405020304" pitchFamily="18" charset="0"/>
-                      </a:endParaRPr>
-                    </a:p>
-                  </a:txBody>
-                  <a:tcPr marL="54349" marR="54349" marT="0" marB="0"/>
-                </a:tc>
-                <a:extLst>
-                  <a:ext uri="{0D108BD9-81ED-4DB2-BD59-A6C34878D82A}">
-                    <a16:rowId xmlns:a16="http://schemas.microsoft.com/office/drawing/2014/main" val="1878788501"/>
-                  </a:ext>
-                </a:extLst>
-              </a:tr>
-            </a:tbl>
-          </a:graphicData>
-        </a:graphic>
-      </p:graphicFrame>
-    </p:spTree>
-  </p:cSld>
-  <p:clrMapOvr>
-    <a:masterClrMapping/>
-  </p:clrMapOvr>
-</p:sld>
-</file>
-
-<file path=ppt/slides/slide9.xml><?xml version="1.0" encoding="utf-8"?>
-<p:sld xmlns:a="http://schemas.openxmlformats.org/drawingml/2006/main" xmlns:r="http://schemas.openxmlformats.org/officeDocument/2006/relationships" xmlns:p="http://schemas.openxmlformats.org/presentationml/2006/main">
-  <p:cSld>
-    <p:spTree>
-      <p:nvGrpSpPr>
-        <p:cNvPr id="1" name=""/>
-        <p:cNvGrpSpPr/>
-        <p:nvPr/>
-      </p:nvGrpSpPr>
-      <p:grpSpPr>
-        <a:xfrm>
-          <a:off x="0" y="0"/>
-          <a:ext cx="0" cy="0"/>
-          <a:chOff x="0" y="0"/>
-          <a:chExt cx="0" cy="0"/>
-        </a:xfrm>
-      </p:grpSpPr>
-      <p:sp>
-        <p:nvSpPr>
-          <p:cNvPr id="2" name="Title 1"/>
-          <p:cNvSpPr>
-            <a:spLocks noGrp="1"/>
-          </p:cNvSpPr>
-          <p:nvPr>
-            <p:ph type="title"/>
-          </p:nvPr>
-        </p:nvSpPr>
-        <p:spPr>
-          <a:xfrm>
-            <a:off x="457200" y="320040"/>
-            <a:ext cx="7239000" cy="518160"/>
-          </a:xfrm>
-        </p:spPr>
-        <p:txBody>
-          <a:bodyPr>
-            <a:normAutofit fontScale="90000"/>
-          </a:bodyPr>
-          <a:lstStyle/>
-          <a:p>
-            <a:r>
-              <a:rPr lang="en-US" dirty="0"/>
-              <a:t>Risks Continued</a:t>
-            </a:r>
-          </a:p>
-        </p:txBody>
-      </p:sp>
-      <p:graphicFrame>
-        <p:nvGraphicFramePr>
-          <p:cNvPr id="5" name="Content Placeholder 4">
-            <a:extLst>
-              <a:ext uri="{FF2B5EF4-FFF2-40B4-BE49-F238E27FC236}">
-                <a16:creationId xmlns:a16="http://schemas.microsoft.com/office/drawing/2014/main" id="{D90AF8D3-9E2C-44FD-8BAD-7B7982F9C08E}"/>
-              </a:ext>
-            </a:extLst>
-          </p:cNvPr>
-          <p:cNvGraphicFramePr>
-            <a:graphicFrameLocks noGrp="1"/>
-          </p:cNvGraphicFramePr>
-          <p:nvPr>
-            <p:ph idx="1"/>
-            <p:extLst>
-              <p:ext uri="{D42A27DB-BD31-4B8C-83A1-F6EECF244321}">
-                <p14:modId xmlns:p14="http://schemas.microsoft.com/office/powerpoint/2010/main" val="3336043837"/>
-              </p:ext>
-            </p:extLst>
-          </p:nvPr>
-        </p:nvGraphicFramePr>
-        <p:xfrm>
-          <a:off x="457200" y="838201"/>
-          <a:ext cx="7239000" cy="5852160"/>
-        </p:xfrm>
-        <a:graphic>
-          <a:graphicData uri="http://schemas.openxmlformats.org/drawingml/2006/table">
-            <a:tbl>
-              <a:tblPr bandRow="1">
-                <a:tableStyleId>{5C22544A-7EE6-4342-B048-85BDC9FD1C3A}</a:tableStyleId>
-              </a:tblPr>
-              <a:tblGrid>
-                <a:gridCol w="1809498">
-                  <a:extLst>
-                    <a:ext uri="{9D8B030D-6E8A-4147-A177-3AD203B41FA5}">
-                      <a16:colId xmlns:a16="http://schemas.microsoft.com/office/drawing/2014/main" val="2592429754"/>
-                    </a:ext>
-                  </a:extLst>
-                </a:gridCol>
-                <a:gridCol w="1809498">
-                  <a:extLst>
-                    <a:ext uri="{9D8B030D-6E8A-4147-A177-3AD203B41FA5}">
-                      <a16:colId xmlns:a16="http://schemas.microsoft.com/office/drawing/2014/main" val="3809378308"/>
-                    </a:ext>
-                  </a:extLst>
-                </a:gridCol>
-                <a:gridCol w="1810002">
-                  <a:extLst>
-                    <a:ext uri="{9D8B030D-6E8A-4147-A177-3AD203B41FA5}">
-                      <a16:colId xmlns:a16="http://schemas.microsoft.com/office/drawing/2014/main" val="3618545182"/>
-                    </a:ext>
-                  </a:extLst>
-                </a:gridCol>
-                <a:gridCol w="1810002">
-                  <a:extLst>
-                    <a:ext uri="{9D8B030D-6E8A-4147-A177-3AD203B41FA5}">
-                      <a16:colId xmlns:a16="http://schemas.microsoft.com/office/drawing/2014/main" val="152360603"/>
-                    </a:ext>
-                  </a:extLst>
-                </a:gridCol>
-              </a:tblGrid>
-              <a:tr h="1393031">
-                <a:tc>
-                  <a:txBody>
-                    <a:bodyPr/>
-                    <a:lstStyle/>
-                    <a:p>
-                      <a:pPr marL="0" marR="0">
-                        <a:spcBef>
-                          <a:spcPts val="0"/>
-                        </a:spcBef>
-                        <a:spcAft>
-                          <a:spcPts val="0"/>
-                        </a:spcAft>
-                      </a:pPr>
-                      <a:r>
-                        <a:rPr lang="en-US" sz="1200" dirty="0">
-                          <a:solidFill>
-                            <a:srgbClr val="000000"/>
-                          </a:solidFill>
-                          <a:effectLst/>
-                          <a:latin typeface="Times New Roman" panose="02020603050405020304" pitchFamily="18" charset="0"/>
-                          <a:ea typeface="Times New Roman" panose="02020603050405020304" pitchFamily="18" charset="0"/>
-                          <a:cs typeface="Times New Roman" panose="02020603050405020304" pitchFamily="18" charset="0"/>
-                        </a:rPr>
-                        <a:t>Tool failure</a:t>
-                      </a:r>
-                      <a:endParaRPr lang="en-US" sz="1200" dirty="0">
-                        <a:effectLst/>
-                        <a:latin typeface="Calibri" panose="020F0502020204030204" pitchFamily="34" charset="0"/>
-                        <a:ea typeface="Calibri" panose="020F0502020204030204" pitchFamily="34" charset="0"/>
-                        <a:cs typeface="Times New Roman" panose="02020603050405020304" pitchFamily="18" charset="0"/>
-                      </a:endParaRPr>
-                    </a:p>
-                  </a:txBody>
-                  <a:tcPr marL="68580" marR="68580" marT="0" marB="0"/>
-                </a:tc>
-                <a:tc>
-                  <a:txBody>
-                    <a:bodyPr/>
-                    <a:lstStyle/>
-                    <a:p>
-                      <a:pPr marL="0" marR="0">
-                        <a:spcBef>
-                          <a:spcPts val="0"/>
-                        </a:spcBef>
-                        <a:spcAft>
-                          <a:spcPts val="0"/>
-                        </a:spcAft>
-                      </a:pPr>
-                      <a:r>
-                        <a:rPr lang="en-US" sz="1200">
-                          <a:solidFill>
-                            <a:srgbClr val="000000"/>
-                          </a:solidFill>
-                          <a:effectLst/>
-                          <a:latin typeface="Times New Roman" panose="02020603050405020304" pitchFamily="18" charset="0"/>
-                          <a:ea typeface="Times New Roman" panose="02020603050405020304" pitchFamily="18" charset="0"/>
-                          <a:cs typeface="Times New Roman" panose="02020603050405020304" pitchFamily="18" charset="0"/>
-                        </a:rPr>
-                        <a:t>The tools we are using could fail. It is not likely and low risk, but anything that can go wrong, will. </a:t>
-                      </a:r>
-                      <a:endParaRPr lang="en-US" sz="1200">
-                        <a:effectLst/>
-                        <a:latin typeface="Calibri" panose="020F0502020204030204" pitchFamily="34" charset="0"/>
-                        <a:ea typeface="Calibri" panose="020F0502020204030204" pitchFamily="34" charset="0"/>
-                        <a:cs typeface="Times New Roman" panose="02020603050405020304" pitchFamily="18" charset="0"/>
-                      </a:endParaRPr>
-                    </a:p>
-                  </a:txBody>
-                  <a:tcPr marL="68580" marR="68580" marT="0" marB="0"/>
-                </a:tc>
-                <a:tc>
-                  <a:txBody>
-                    <a:bodyPr/>
-                    <a:lstStyle/>
-                    <a:p>
-                      <a:pPr marL="0" marR="0">
-                        <a:spcBef>
-                          <a:spcPts val="0"/>
-                        </a:spcBef>
-                        <a:spcAft>
-                          <a:spcPts val="0"/>
-                        </a:spcAft>
-                      </a:pPr>
-                      <a:r>
-                        <a:rPr lang="en-US" sz="1200">
-                          <a:solidFill>
-                            <a:srgbClr val="000000"/>
-                          </a:solidFill>
-                          <a:effectLst/>
-                          <a:latin typeface="Times New Roman" panose="02020603050405020304" pitchFamily="18" charset="0"/>
-                          <a:ea typeface="Times New Roman" panose="02020603050405020304" pitchFamily="18" charset="0"/>
-                          <a:cs typeface="Times New Roman" panose="02020603050405020304" pitchFamily="18" charset="0"/>
-                        </a:rPr>
-                        <a:t>Keep up to date with the environments, have everything loaded, and play with the environment ahead of development. </a:t>
-                      </a:r>
-                      <a:endParaRPr lang="en-US" sz="1200">
-                        <a:effectLst/>
-                        <a:latin typeface="Calibri" panose="020F0502020204030204" pitchFamily="34" charset="0"/>
-                        <a:ea typeface="Calibri" panose="020F0502020204030204" pitchFamily="34" charset="0"/>
-                        <a:cs typeface="Times New Roman" panose="02020603050405020304" pitchFamily="18" charset="0"/>
-                      </a:endParaRPr>
-                    </a:p>
-                  </a:txBody>
-                  <a:tcPr marL="68580" marR="68580" marT="0" marB="0"/>
-                </a:tc>
-                <a:tc>
-                  <a:txBody>
-                    <a:bodyPr/>
-                    <a:lstStyle/>
-                    <a:p>
-                      <a:pPr marL="0" marR="0">
-                        <a:spcBef>
-                          <a:spcPts val="0"/>
-                        </a:spcBef>
-                        <a:spcAft>
-                          <a:spcPts val="0"/>
-                        </a:spcAft>
-                      </a:pPr>
-                      <a:r>
-                        <a:rPr lang="en-US" sz="1200">
-                          <a:solidFill>
-                            <a:srgbClr val="000000"/>
-                          </a:solidFill>
-                          <a:effectLst/>
-                          <a:latin typeface="Times New Roman" panose="02020603050405020304" pitchFamily="18" charset="0"/>
-                          <a:ea typeface="Times New Roman" panose="02020603050405020304" pitchFamily="18" charset="0"/>
-                          <a:cs typeface="Times New Roman" panose="02020603050405020304" pitchFamily="18" charset="0"/>
-                        </a:rPr>
-                        <a:t>This may be unavoidable if it does happen. However, keep your environment up to date, and make sure they are installed correctly. If you run into an issue, ask the team how they are set up to avoid it. </a:t>
-                      </a:r>
-                      <a:endParaRPr lang="en-US" sz="1200">
-                        <a:effectLst/>
-                        <a:latin typeface="Calibri" panose="020F0502020204030204" pitchFamily="34" charset="0"/>
-                        <a:ea typeface="Calibri" panose="020F0502020204030204" pitchFamily="34" charset="0"/>
-                        <a:cs typeface="Times New Roman" panose="02020603050405020304" pitchFamily="18" charset="0"/>
-                      </a:endParaRPr>
-                    </a:p>
-                  </a:txBody>
-                  <a:tcPr marL="68580" marR="68580" marT="0" marB="0"/>
-                </a:tc>
-                <a:extLst>
-                  <a:ext uri="{0D108BD9-81ED-4DB2-BD59-A6C34878D82A}">
-                    <a16:rowId xmlns:a16="http://schemas.microsoft.com/office/drawing/2014/main" val="2860719083"/>
-                  </a:ext>
-                </a:extLst>
-              </a:tr>
-              <a:tr h="1547813">
-                <a:tc>
-                  <a:txBody>
-                    <a:bodyPr/>
-                    <a:lstStyle/>
-                    <a:p>
-                      <a:pPr marL="0" marR="0">
-                        <a:spcBef>
-                          <a:spcPts val="0"/>
-                        </a:spcBef>
-                        <a:spcAft>
-                          <a:spcPts val="0"/>
-                        </a:spcAft>
-                      </a:pPr>
-                      <a:r>
-                        <a:rPr lang="en-US" sz="1200" dirty="0">
-                          <a:solidFill>
-                            <a:srgbClr val="000000"/>
-                          </a:solidFill>
-                          <a:effectLst/>
-                          <a:latin typeface="Times New Roman" panose="02020603050405020304" pitchFamily="18" charset="0"/>
-                          <a:ea typeface="Times New Roman" panose="02020603050405020304" pitchFamily="18" charset="0"/>
-                          <a:cs typeface="Times New Roman" panose="02020603050405020304" pitchFamily="18" charset="0"/>
-                        </a:rPr>
-                        <a:t>School Assignments</a:t>
-                      </a:r>
-                      <a:endParaRPr lang="en-US" sz="1200" dirty="0">
-                        <a:effectLst/>
-                        <a:latin typeface="Calibri" panose="020F0502020204030204" pitchFamily="34" charset="0"/>
-                        <a:ea typeface="Calibri" panose="020F0502020204030204" pitchFamily="34" charset="0"/>
-                        <a:cs typeface="Times New Roman" panose="02020603050405020304" pitchFamily="18" charset="0"/>
-                      </a:endParaRPr>
-                    </a:p>
-                  </a:txBody>
-                  <a:tcPr marL="68580" marR="68580" marT="0" marB="0"/>
-                </a:tc>
-                <a:tc>
-                  <a:txBody>
-                    <a:bodyPr/>
-                    <a:lstStyle/>
-                    <a:p>
-                      <a:pPr marL="0" marR="0">
-                        <a:spcBef>
-                          <a:spcPts val="0"/>
-                        </a:spcBef>
-                        <a:spcAft>
-                          <a:spcPts val="0"/>
-                        </a:spcAft>
-                      </a:pPr>
-                      <a:r>
-                        <a:rPr lang="en-US" sz="1200" dirty="0">
-                          <a:solidFill>
-                            <a:srgbClr val="000000"/>
-                          </a:solidFill>
-                          <a:effectLst/>
-                          <a:latin typeface="Times New Roman" panose="02020603050405020304" pitchFamily="18" charset="0"/>
-                          <a:ea typeface="Times New Roman" panose="02020603050405020304" pitchFamily="18" charset="0"/>
-                          <a:cs typeface="Times New Roman" panose="02020603050405020304" pitchFamily="18" charset="0"/>
-                        </a:rPr>
-                        <a:t>Since we are having to learn these skills as we go, and have individual assignments with no direct instruction, the individual assignments take longer than in other courses. This takes more time for us to work on, and pushes project development back</a:t>
-                      </a:r>
-                      <a:endParaRPr lang="en-US" sz="1200" dirty="0">
-                        <a:effectLst/>
-                        <a:latin typeface="Calibri" panose="020F0502020204030204" pitchFamily="34" charset="0"/>
-                        <a:ea typeface="Calibri" panose="020F0502020204030204" pitchFamily="34" charset="0"/>
-                        <a:cs typeface="Times New Roman" panose="02020603050405020304" pitchFamily="18" charset="0"/>
-                      </a:endParaRPr>
-                    </a:p>
-                  </a:txBody>
-                  <a:tcPr marL="68580" marR="68580" marT="0" marB="0"/>
-                </a:tc>
-                <a:tc>
-                  <a:txBody>
-                    <a:bodyPr/>
-                    <a:lstStyle/>
-                    <a:p>
-                      <a:pPr marL="0" marR="0">
-                        <a:spcBef>
-                          <a:spcPts val="0"/>
-                        </a:spcBef>
-                        <a:spcAft>
-                          <a:spcPts val="0"/>
-                        </a:spcAft>
-                      </a:pPr>
-                      <a:r>
-                        <a:rPr lang="en-US" sz="1200" dirty="0">
-                          <a:solidFill>
-                            <a:srgbClr val="000000"/>
-                          </a:solidFill>
-                          <a:effectLst/>
-                          <a:latin typeface="Times New Roman" panose="02020603050405020304" pitchFamily="18" charset="0"/>
-                          <a:ea typeface="Times New Roman" panose="02020603050405020304" pitchFamily="18" charset="0"/>
-                          <a:cs typeface="Times New Roman" panose="02020603050405020304" pitchFamily="18" charset="0"/>
-                        </a:rPr>
-                        <a:t>Starting work earlier in the week helps to buy some extra time towards the end of the week.</a:t>
-                      </a:r>
-                      <a:endParaRPr lang="en-US" sz="1200" dirty="0">
-                        <a:effectLst/>
-                        <a:latin typeface="Calibri" panose="020F0502020204030204" pitchFamily="34" charset="0"/>
-                        <a:ea typeface="Calibri" panose="020F0502020204030204" pitchFamily="34" charset="0"/>
-                        <a:cs typeface="Times New Roman" panose="02020603050405020304" pitchFamily="18" charset="0"/>
-                      </a:endParaRPr>
-                    </a:p>
-                  </a:txBody>
-                  <a:tcPr marL="68580" marR="68580" marT="0" marB="0"/>
-                </a:tc>
-                <a:tc>
-                  <a:txBody>
-                    <a:bodyPr/>
-                    <a:lstStyle/>
-                    <a:p>
-                      <a:pPr marL="0" marR="0">
-                        <a:spcBef>
-                          <a:spcPts val="0"/>
-                        </a:spcBef>
-                        <a:spcAft>
-                          <a:spcPts val="0"/>
-                        </a:spcAft>
-                      </a:pPr>
-                      <a:r>
-                        <a:rPr lang="en-US" sz="1200">
-                          <a:solidFill>
-                            <a:srgbClr val="000000"/>
-                          </a:solidFill>
-                          <a:effectLst/>
-                          <a:latin typeface="Times New Roman" panose="02020603050405020304" pitchFamily="18" charset="0"/>
-                          <a:ea typeface="Times New Roman" panose="02020603050405020304" pitchFamily="18" charset="0"/>
-                          <a:cs typeface="Times New Roman" panose="02020603050405020304" pitchFamily="18" charset="0"/>
-                        </a:rPr>
-                        <a:t>Long term getting ahead and keeping to the overall set schedules will help to buy back time. </a:t>
-                      </a:r>
-                      <a:endParaRPr lang="en-US" sz="1200">
-                        <a:effectLst/>
-                        <a:latin typeface="Calibri" panose="020F0502020204030204" pitchFamily="34" charset="0"/>
-                        <a:ea typeface="Calibri" panose="020F0502020204030204" pitchFamily="34" charset="0"/>
-                        <a:cs typeface="Times New Roman" panose="02020603050405020304" pitchFamily="18" charset="0"/>
-                      </a:endParaRPr>
-                    </a:p>
-                  </a:txBody>
-                  <a:tcPr marL="68580" marR="68580" marT="0" marB="0"/>
-                </a:tc>
-                <a:extLst>
-                  <a:ext uri="{0D108BD9-81ED-4DB2-BD59-A6C34878D82A}">
-                    <a16:rowId xmlns:a16="http://schemas.microsoft.com/office/drawing/2014/main" val="2772022293"/>
-                  </a:ext>
-                </a:extLst>
-              </a:tr>
-              <a:tr h="2012156">
-                <a:tc>
-                  <a:txBody>
-                    <a:bodyPr/>
-                    <a:lstStyle/>
-                    <a:p>
-                      <a:pPr marL="0" marR="0">
-                        <a:spcBef>
-                          <a:spcPts val="0"/>
-                        </a:spcBef>
-                        <a:spcAft>
-                          <a:spcPts val="0"/>
-                        </a:spcAft>
-                      </a:pPr>
-                      <a:r>
-                        <a:rPr lang="en-US" sz="1200">
-                          <a:solidFill>
-                            <a:srgbClr val="000000"/>
-                          </a:solidFill>
-                          <a:effectLst/>
-                          <a:latin typeface="Times New Roman" panose="02020603050405020304" pitchFamily="18" charset="0"/>
-                          <a:ea typeface="Times New Roman" panose="02020603050405020304" pitchFamily="18" charset="0"/>
-                          <a:cs typeface="Times New Roman" panose="02020603050405020304" pitchFamily="18" charset="0"/>
-                        </a:rPr>
-                        <a:t>Work</a:t>
-                      </a:r>
-                      <a:endParaRPr lang="en-US" sz="1200">
-                        <a:effectLst/>
-                        <a:latin typeface="Calibri" panose="020F0502020204030204" pitchFamily="34" charset="0"/>
-                        <a:ea typeface="Calibri" panose="020F0502020204030204" pitchFamily="34" charset="0"/>
-                        <a:cs typeface="Times New Roman" panose="02020603050405020304" pitchFamily="18" charset="0"/>
-                      </a:endParaRPr>
-                    </a:p>
-                  </a:txBody>
-                  <a:tcPr marL="68580" marR="68580" marT="0" marB="0"/>
-                </a:tc>
-                <a:tc>
-                  <a:txBody>
-                    <a:bodyPr/>
-                    <a:lstStyle/>
-                    <a:p>
-                      <a:pPr marL="0" marR="0">
-                        <a:spcBef>
-                          <a:spcPts val="0"/>
-                        </a:spcBef>
-                        <a:spcAft>
-                          <a:spcPts val="0"/>
-                        </a:spcAft>
-                      </a:pPr>
-                      <a:r>
-                        <a:rPr lang="en-US" sz="1200">
-                          <a:solidFill>
-                            <a:srgbClr val="000000"/>
-                          </a:solidFill>
-                          <a:effectLst/>
-                          <a:latin typeface="Times New Roman" panose="02020603050405020304" pitchFamily="18" charset="0"/>
-                          <a:ea typeface="Times New Roman" panose="02020603050405020304" pitchFamily="18" charset="0"/>
-                          <a:cs typeface="Times New Roman" panose="02020603050405020304" pitchFamily="18" charset="0"/>
-                        </a:rPr>
-                        <a:t>Some of us work full time, and or part time, that consumes a majority of the day and an individual’s energy. Class is added pressure to someone who works, and class is secondary to making a living, if someone has to choose between making a grade and paying bills it’s obvious what someone will choose. </a:t>
-                      </a:r>
-                      <a:endParaRPr lang="en-US" sz="1200">
-                        <a:effectLst/>
-                        <a:latin typeface="Calibri" panose="020F0502020204030204" pitchFamily="34" charset="0"/>
-                        <a:ea typeface="Calibri" panose="020F0502020204030204" pitchFamily="34" charset="0"/>
-                        <a:cs typeface="Times New Roman" panose="02020603050405020304" pitchFamily="18" charset="0"/>
-                      </a:endParaRPr>
-                    </a:p>
-                  </a:txBody>
-                  <a:tcPr marL="68580" marR="68580" marT="0" marB="0"/>
-                </a:tc>
-                <a:tc>
-                  <a:txBody>
-                    <a:bodyPr/>
-                    <a:lstStyle/>
-                    <a:p>
-                      <a:pPr marL="0" marR="0">
-                        <a:spcBef>
-                          <a:spcPts val="0"/>
-                        </a:spcBef>
-                        <a:spcAft>
-                          <a:spcPts val="0"/>
-                        </a:spcAft>
-                      </a:pPr>
-                      <a:r>
-                        <a:rPr lang="en-US" sz="1200" dirty="0">
-                          <a:solidFill>
-                            <a:srgbClr val="000000"/>
-                          </a:solidFill>
-                          <a:effectLst/>
-                          <a:latin typeface="Times New Roman" panose="02020603050405020304" pitchFamily="18" charset="0"/>
-                          <a:ea typeface="Times New Roman" panose="02020603050405020304" pitchFamily="18" charset="0"/>
-                          <a:cs typeface="Times New Roman" panose="02020603050405020304" pitchFamily="18" charset="0"/>
-                        </a:rPr>
-                        <a:t>Keeping a schedule to separate work from school, to avoid burnout. Let your boss know that you are in school and the scope of the project being taken on to complete the course. </a:t>
-                      </a:r>
-                      <a:endParaRPr lang="en-US" sz="1200" dirty="0">
-                        <a:effectLst/>
-                        <a:latin typeface="Calibri" panose="020F0502020204030204" pitchFamily="34" charset="0"/>
-                        <a:ea typeface="Calibri" panose="020F0502020204030204" pitchFamily="34" charset="0"/>
-                        <a:cs typeface="Times New Roman" panose="02020603050405020304" pitchFamily="18" charset="0"/>
-                      </a:endParaRPr>
-                    </a:p>
-                  </a:txBody>
-                  <a:tcPr marL="68580" marR="68580" marT="0" marB="0"/>
-                </a:tc>
-                <a:tc>
-                  <a:txBody>
-                    <a:bodyPr/>
-                    <a:lstStyle/>
-                    <a:p>
-                      <a:pPr marL="0" marR="0">
-                        <a:spcBef>
-                          <a:spcPts val="0"/>
-                        </a:spcBef>
-                        <a:spcAft>
-                          <a:spcPts val="0"/>
-                        </a:spcAft>
-                      </a:pPr>
-                      <a:r>
-                        <a:rPr lang="en-US" sz="1200" dirty="0">
-                          <a:solidFill>
-                            <a:srgbClr val="000000"/>
-                          </a:solidFill>
-                          <a:effectLst/>
-                          <a:latin typeface="Times New Roman" panose="02020603050405020304" pitchFamily="18" charset="0"/>
-                          <a:ea typeface="Times New Roman" panose="02020603050405020304" pitchFamily="18" charset="0"/>
-                          <a:cs typeface="Times New Roman" panose="02020603050405020304" pitchFamily="18" charset="0"/>
-                        </a:rPr>
-                        <a:t>Let the team know if you have a job. Plan out your week for yourself, and do not wait till the end of the week to work on your portion. Inform your boss that you may need a lighter workload if you need work time to get things done. </a:t>
-                      </a:r>
-                      <a:endParaRPr lang="en-US" sz="1200" dirty="0">
-                        <a:effectLst/>
-                        <a:latin typeface="Calibri" panose="020F0502020204030204" pitchFamily="34" charset="0"/>
-                        <a:ea typeface="Calibri" panose="020F0502020204030204" pitchFamily="34" charset="0"/>
-                        <a:cs typeface="Times New Roman" panose="02020603050405020304" pitchFamily="18" charset="0"/>
-                      </a:endParaRPr>
-                    </a:p>
-                  </a:txBody>
-                  <a:tcPr marL="68580" marR="68580" marT="0" marB="0"/>
-                </a:tc>
-                <a:extLst>
-                  <a:ext uri="{0D108BD9-81ED-4DB2-BD59-A6C34878D82A}">
-                    <a16:rowId xmlns:a16="http://schemas.microsoft.com/office/drawing/2014/main" val="1705593883"/>
-                  </a:ext>
-                </a:extLst>
-              </a:tr>
-            </a:tbl>
-          </a:graphicData>
-        </a:graphic>
-      </p:graphicFrame>
-    </p:spTree>
-    <p:extLst>
-      <p:ext uri="{BB962C8B-B14F-4D97-AF65-F5344CB8AC3E}">
-        <p14:creationId xmlns:p14="http://schemas.microsoft.com/office/powerpoint/2010/main" val="2811163133"/>
-      </p:ext>
-    </p:extLst>
-  </p:cSld>
-  <p:clrMapOvr>
-    <a:masterClrMapping/>
-  </p:clrMapOvr>
-</p:sld>
-</file>
-
 <file path=ppt/theme/theme1.xml><?xml version="1.0" encoding="utf-8"?>
 <a:theme xmlns:a="http://schemas.openxmlformats.org/drawingml/2006/main" name="Opulent">
   <a:themeElements>

</xml_diff>